<commit_message>
MCP Code .NET Conf.
</commit_message>
<xml_diff>
--- a/DotNet-Conf/deck/dotnet-mcp.pptx
+++ b/DotNet-Conf/deck/dotnet-mcp.pptx
@@ -120,6 +120,11 @@
       </a:defRPr>
     </a:lvl9pPr>
   </p:defaultTextStyle>
+  <p:extLst>
+    <p:ext uri="{EFAFB233-063F-42B5-8137-9DF3F51BA10A}">
+      <p15:sldGuideLst xmlns:p15="http://schemas.microsoft.com/office/powerpoint/2012/main"/>
+    </p:ext>
+  </p:extLst>
 </p:presentation>
 </file>
 
@@ -128,7 +133,7 @@
   <pc:docChgLst>
     <pc:chgData name="Niels Berglund" userId="6462ffc3c746bb1c" providerId="LiveId" clId="{572CFA61-6849-42BD-B1DA-93EA9D7DCECD}"/>
     <pc:docChg chg="undo redo custSel addSld delSld modSld">
-      <pc:chgData name="Niels Berglund" userId="6462ffc3c746bb1c" providerId="LiveId" clId="{572CFA61-6849-42BD-B1DA-93EA9D7DCECD}" dt="2025-11-01T13:29:03.128" v="1240"/>
+      <pc:chgData name="Niels Berglund" userId="6462ffc3c746bb1c" providerId="LiveId" clId="{572CFA61-6849-42BD-B1DA-93EA9D7DCECD}" dt="2025-11-20T10:33:49.792" v="1251" actId="20577"/>
       <pc:docMkLst>
         <pc:docMk/>
       </pc:docMkLst>
@@ -138,30 +143,6 @@
           <pc:docMk/>
           <pc:sldMk cId="3785071296" sldId="256"/>
         </pc:sldMkLst>
-        <pc:spChg chg="del mod">
-          <ac:chgData name="Niels Berglund" userId="6462ffc3c746bb1c" providerId="LiveId" clId="{572CFA61-6849-42BD-B1DA-93EA9D7DCECD}" dt="2025-11-01T12:35:03.480" v="672" actId="478"/>
-          <ac:spMkLst>
-            <pc:docMk/>
-            <pc:sldMk cId="3785071296" sldId="256"/>
-            <ac:spMk id="2" creationId="{F70846D6-DC37-2C48-1AA2-ACB1D2E14245}"/>
-          </ac:spMkLst>
-        </pc:spChg>
-        <pc:spChg chg="del">
-          <ac:chgData name="Niels Berglund" userId="6462ffc3c746bb1c" providerId="LiveId" clId="{572CFA61-6849-42BD-B1DA-93EA9D7DCECD}" dt="2025-11-01T12:35:36.281" v="676" actId="478"/>
-          <ac:spMkLst>
-            <pc:docMk/>
-            <pc:sldMk cId="3785071296" sldId="256"/>
-            <ac:spMk id="3" creationId="{5E023EF4-EE24-058E-0DA9-00819DB5DAC7}"/>
-          </ac:spMkLst>
-        </pc:spChg>
-        <pc:spChg chg="add del mod">
-          <ac:chgData name="Niels Berglund" userId="6462ffc3c746bb1c" providerId="LiveId" clId="{572CFA61-6849-42BD-B1DA-93EA9D7DCECD}" dt="2025-11-01T12:35:07.705" v="673" actId="478"/>
-          <ac:spMkLst>
-            <pc:docMk/>
-            <pc:sldMk cId="3785071296" sldId="256"/>
-            <ac:spMk id="5" creationId="{4D3160AF-9890-5F7D-D0A3-3DD4D5FBF546}"/>
-          </ac:spMkLst>
-        </pc:spChg>
         <pc:spChg chg="add mod">
           <ac:chgData name="Niels Berglund" userId="6462ffc3c746bb1c" providerId="LiveId" clId="{572CFA61-6849-42BD-B1DA-93EA9D7DCECD}" dt="2025-11-01T12:38:06.726" v="690" actId="207"/>
           <ac:spMkLst>
@@ -217,14 +198,6 @@
             <ac:picMk id="9" creationId="{3111A7F0-00EA-FF47-030E-B3201B19BA55}"/>
           </ac:picMkLst>
         </pc:picChg>
-        <pc:picChg chg="add del mod ord">
-          <ac:chgData name="Niels Berglund" userId="6462ffc3c746bb1c" providerId="LiveId" clId="{572CFA61-6849-42BD-B1DA-93EA9D7DCECD}" dt="2025-11-01T12:42:26.931" v="720" actId="478"/>
-          <ac:picMkLst>
-            <pc:docMk/>
-            <pc:sldMk cId="781112186" sldId="257"/>
-            <ac:picMk id="11" creationId="{B6741D6D-6CBB-502C-DE5B-3A7B4E2AAF0F}"/>
-          </ac:picMkLst>
-        </pc:picChg>
         <pc:picChg chg="add mod ord">
           <ac:chgData name="Niels Berglund" userId="6462ffc3c746bb1c" providerId="LiveId" clId="{572CFA61-6849-42BD-B1DA-93EA9D7DCECD}" dt="2025-11-01T12:42:44.783" v="724" actId="167"/>
           <ac:picMkLst>
@@ -233,21 +206,6 @@
             <ac:picMk id="13" creationId="{43C7D197-87E5-808B-80E0-033DFA36A5AC}"/>
           </ac:picMkLst>
         </pc:picChg>
-      </pc:sldChg>
-      <pc:sldChg chg="modSp del mod">
-        <pc:chgData name="Niels Berglund" userId="6462ffc3c746bb1c" providerId="LiveId" clId="{572CFA61-6849-42BD-B1DA-93EA9D7DCECD}" dt="2025-11-01T13:15:43.835" v="1195" actId="47"/>
-        <pc:sldMkLst>
-          <pc:docMk/>
-          <pc:sldMk cId="2122901675" sldId="258"/>
-        </pc:sldMkLst>
-        <pc:spChg chg="mod">
-          <ac:chgData name="Niels Berglund" userId="6462ffc3c746bb1c" providerId="LiveId" clId="{572CFA61-6849-42BD-B1DA-93EA9D7DCECD}" dt="2025-11-01T11:36:16.072" v="341" actId="6549"/>
-          <ac:spMkLst>
-            <pc:docMk/>
-            <pc:sldMk cId="2122901675" sldId="258"/>
-            <ac:spMk id="3" creationId="{7D2F7EBB-0B6A-31F2-69D8-D28648AF7977}"/>
-          </ac:spMkLst>
-        </pc:spChg>
       </pc:sldChg>
       <pc:sldChg chg="addSp modSp mod">
         <pc:chgData name="Niels Berglund" userId="6462ffc3c746bb1c" providerId="LiveId" clId="{572CFA61-6849-42BD-B1DA-93EA9D7DCECD}" dt="2025-11-01T12:43:16.407" v="729" actId="167"/>
@@ -302,38 +260,6 @@
             <ac:spMk id="5" creationId="{3EB7FC8B-7276-D1DC-4BC1-8A6EC6F6E5BE}"/>
           </ac:spMkLst>
         </pc:spChg>
-        <pc:spChg chg="del mod">
-          <ac:chgData name="Niels Berglund" userId="6462ffc3c746bb1c" providerId="LiveId" clId="{572CFA61-6849-42BD-B1DA-93EA9D7DCECD}" dt="2025-11-01T10:40:00.419" v="21" actId="478"/>
-          <ac:spMkLst>
-            <pc:docMk/>
-            <pc:sldMk cId="465395078" sldId="260"/>
-            <ac:spMk id="6" creationId="{723C53F0-7778-13C2-48DD-83D0F8FE9F6A}"/>
-          </ac:spMkLst>
-        </pc:spChg>
-        <pc:spChg chg="del mod">
-          <ac:chgData name="Niels Berglund" userId="6462ffc3c746bb1c" providerId="LiveId" clId="{572CFA61-6849-42BD-B1DA-93EA9D7DCECD}" dt="2025-11-01T10:39:51.663" v="19" actId="478"/>
-          <ac:spMkLst>
-            <pc:docMk/>
-            <pc:sldMk cId="465395078" sldId="260"/>
-            <ac:spMk id="7" creationId="{177D8DB2-B3EB-BA46-7D0F-C5AD315F0D54}"/>
-          </ac:spMkLst>
-        </pc:spChg>
-        <pc:spChg chg="add del mod">
-          <ac:chgData name="Niels Berglund" userId="6462ffc3c746bb1c" providerId="LiveId" clId="{572CFA61-6849-42BD-B1DA-93EA9D7DCECD}" dt="2025-11-01T10:39:55.956" v="20" actId="478"/>
-          <ac:spMkLst>
-            <pc:docMk/>
-            <pc:sldMk cId="465395078" sldId="260"/>
-            <ac:spMk id="9" creationId="{3FE919B3-00C9-F148-7387-B6990F40CAF4}"/>
-          </ac:spMkLst>
-        </pc:spChg>
-        <pc:spChg chg="add del mod">
-          <ac:chgData name="Niels Berglund" userId="6462ffc3c746bb1c" providerId="LiveId" clId="{572CFA61-6849-42BD-B1DA-93EA9D7DCECD}" dt="2025-11-01T10:40:05.262" v="22" actId="478"/>
-          <ac:spMkLst>
-            <pc:docMk/>
-            <pc:sldMk cId="465395078" sldId="260"/>
-            <ac:spMk id="11" creationId="{F6C5FF10-0747-092E-B669-AB4E97888681}"/>
-          </ac:spMkLst>
-        </pc:spChg>
         <pc:picChg chg="add mod ord">
           <ac:chgData name="Niels Berglund" userId="6462ffc3c746bb1c" providerId="LiveId" clId="{572CFA61-6849-42BD-B1DA-93EA9D7DCECD}" dt="2025-11-01T12:46:14.663" v="733" actId="167"/>
           <ac:picMkLst>
@@ -355,126 +281,6 @@
             <pc:docMk/>
             <pc:sldMk cId="465671313" sldId="261"/>
             <ac:spMk id="2" creationId="{195AE836-9AC2-48E7-A742-F2B5DC96B48E}"/>
-          </ac:spMkLst>
-        </pc:spChg>
-        <pc:spChg chg="del">
-          <ac:chgData name="Niels Berglund" userId="6462ffc3c746bb1c" providerId="LiveId" clId="{572CFA61-6849-42BD-B1DA-93EA9D7DCECD}" dt="2025-11-01T10:46:43.827" v="52" actId="478"/>
-          <ac:spMkLst>
-            <pc:docMk/>
-            <pc:sldMk cId="465671313" sldId="261"/>
-            <ac:spMk id="3" creationId="{306887C7-4546-683E-79E4-472B492E922C}"/>
-          </ac:spMkLst>
-        </pc:spChg>
-        <pc:spChg chg="del">
-          <ac:chgData name="Niels Berglund" userId="6462ffc3c746bb1c" providerId="LiveId" clId="{572CFA61-6849-42BD-B1DA-93EA9D7DCECD}" dt="2025-11-01T10:46:43.827" v="52" actId="478"/>
-          <ac:spMkLst>
-            <pc:docMk/>
-            <pc:sldMk cId="465671313" sldId="261"/>
-            <ac:spMk id="4" creationId="{1D7DB1E1-248F-AF3F-07E4-AD7D94302250}"/>
-          </ac:spMkLst>
-        </pc:spChg>
-        <pc:spChg chg="del">
-          <ac:chgData name="Niels Berglund" userId="6462ffc3c746bb1c" providerId="LiveId" clId="{572CFA61-6849-42BD-B1DA-93EA9D7DCECD}" dt="2025-11-01T10:46:43.827" v="52" actId="478"/>
-          <ac:spMkLst>
-            <pc:docMk/>
-            <pc:sldMk cId="465671313" sldId="261"/>
-            <ac:spMk id="5" creationId="{90EB2042-787C-BD13-EA76-D73B14CB984F}"/>
-          </ac:spMkLst>
-        </pc:spChg>
-        <pc:spChg chg="add del mod">
-          <ac:chgData name="Niels Berglund" userId="6462ffc3c746bb1c" providerId="LiveId" clId="{572CFA61-6849-42BD-B1DA-93EA9D7DCECD}" dt="2025-11-01T11:11:46.919" v="157" actId="478"/>
-          <ac:spMkLst>
-            <pc:docMk/>
-            <pc:sldMk cId="465671313" sldId="261"/>
-            <ac:spMk id="6" creationId="{33441BD1-95E2-906A-6146-0B002A3497FE}"/>
-          </ac:spMkLst>
-        </pc:spChg>
-        <pc:spChg chg="add del mod">
-          <ac:chgData name="Niels Berglund" userId="6462ffc3c746bb1c" providerId="LiveId" clId="{572CFA61-6849-42BD-B1DA-93EA9D7DCECD}" dt="2025-11-01T11:11:50.607" v="158" actId="478"/>
-          <ac:spMkLst>
-            <pc:docMk/>
-            <pc:sldMk cId="465671313" sldId="261"/>
-            <ac:spMk id="7" creationId="{0966963E-8873-8C83-9136-A34751909C61}"/>
-          </ac:spMkLst>
-        </pc:spChg>
-        <pc:spChg chg="add del mod">
-          <ac:chgData name="Niels Berglund" userId="6462ffc3c746bb1c" providerId="LiveId" clId="{572CFA61-6849-42BD-B1DA-93EA9D7DCECD}" dt="2025-11-01T11:11:50.607" v="158" actId="478"/>
-          <ac:spMkLst>
-            <pc:docMk/>
-            <pc:sldMk cId="465671313" sldId="261"/>
-            <ac:spMk id="8" creationId="{132C4DA8-AEAA-6951-F665-AD6AADE65341}"/>
-          </ac:spMkLst>
-        </pc:spChg>
-        <pc:spChg chg="add del mod">
-          <ac:chgData name="Niels Berglund" userId="6462ffc3c746bb1c" providerId="LiveId" clId="{572CFA61-6849-42BD-B1DA-93EA9D7DCECD}" dt="2025-11-01T11:11:50.607" v="158" actId="478"/>
-          <ac:spMkLst>
-            <pc:docMk/>
-            <pc:sldMk cId="465671313" sldId="261"/>
-            <ac:spMk id="9" creationId="{7935E5F4-2601-4CC2-90A5-F416EF69F655}"/>
-          </ac:spMkLst>
-        </pc:spChg>
-        <pc:spChg chg="add del mod">
-          <ac:chgData name="Niels Berglund" userId="6462ffc3c746bb1c" providerId="LiveId" clId="{572CFA61-6849-42BD-B1DA-93EA9D7DCECD}" dt="2025-11-01T11:12:20.968" v="161" actId="478"/>
-          <ac:spMkLst>
-            <pc:docMk/>
-            <pc:sldMk cId="465671313" sldId="261"/>
-            <ac:spMk id="10" creationId="{63D3FA81-0C03-5D53-8549-CDB92E0B138F}"/>
-          </ac:spMkLst>
-        </pc:spChg>
-        <pc:spChg chg="add del mod">
-          <ac:chgData name="Niels Berglund" userId="6462ffc3c746bb1c" providerId="LiveId" clId="{572CFA61-6849-42BD-B1DA-93EA9D7DCECD}" dt="2025-11-01T11:12:18.745" v="160" actId="478"/>
-          <ac:spMkLst>
-            <pc:docMk/>
-            <pc:sldMk cId="465671313" sldId="261"/>
-            <ac:spMk id="11" creationId="{7B886CD2-8E95-96C3-F81B-38702A9DB84E}"/>
-          </ac:spMkLst>
-        </pc:spChg>
-        <pc:spChg chg="del mod">
-          <ac:chgData name="Niels Berglund" userId="6462ffc3c746bb1c" providerId="LiveId" clId="{572CFA61-6849-42BD-B1DA-93EA9D7DCECD}" dt="2025-11-01T11:12:18.745" v="160" actId="478"/>
-          <ac:spMkLst>
-            <pc:docMk/>
-            <pc:sldMk cId="465671313" sldId="261"/>
-            <ac:spMk id="12" creationId="{E365AD6C-EC70-1DAE-6FDD-0BCD4ACC24B8}"/>
-          </ac:spMkLst>
-        </pc:spChg>
-        <pc:spChg chg="add del mod">
-          <ac:chgData name="Niels Berglund" userId="6462ffc3c746bb1c" providerId="LiveId" clId="{572CFA61-6849-42BD-B1DA-93EA9D7DCECD}" dt="2025-11-01T11:12:18.745" v="160" actId="478"/>
-          <ac:spMkLst>
-            <pc:docMk/>
-            <pc:sldMk cId="465671313" sldId="261"/>
-            <ac:spMk id="13" creationId="{A0BBA1C2-12CA-F15F-92A6-5745AA02736C}"/>
-          </ac:spMkLst>
-        </pc:spChg>
-        <pc:spChg chg="add del mod">
-          <ac:chgData name="Niels Berglund" userId="6462ffc3c746bb1c" providerId="LiveId" clId="{572CFA61-6849-42BD-B1DA-93EA9D7DCECD}" dt="2025-11-01T11:12:18.745" v="160" actId="478"/>
-          <ac:spMkLst>
-            <pc:docMk/>
-            <pc:sldMk cId="465671313" sldId="261"/>
-            <ac:spMk id="14" creationId="{773E835B-6493-9207-D2FB-98AF83AC5AB4}"/>
-          </ac:spMkLst>
-        </pc:spChg>
-        <pc:spChg chg="add del mod">
-          <ac:chgData name="Niels Berglund" userId="6462ffc3c746bb1c" providerId="LiveId" clId="{572CFA61-6849-42BD-B1DA-93EA9D7DCECD}" dt="2025-11-01T11:12:18.745" v="160" actId="478"/>
-          <ac:spMkLst>
-            <pc:docMk/>
-            <pc:sldMk cId="465671313" sldId="261"/>
-            <ac:spMk id="15" creationId="{2FB050CA-2A10-D925-B976-2148E85B9A2F}"/>
-          </ac:spMkLst>
-        </pc:spChg>
-        <pc:spChg chg="del mod">
-          <ac:chgData name="Niels Berglund" userId="6462ffc3c746bb1c" providerId="LiveId" clId="{572CFA61-6849-42BD-B1DA-93EA9D7DCECD}" dt="2025-11-01T11:12:18.745" v="160" actId="478"/>
-          <ac:spMkLst>
-            <pc:docMk/>
-            <pc:sldMk cId="465671313" sldId="261"/>
-            <ac:spMk id="16" creationId="{1D83E6CD-46B8-EE40-7A64-9EA9D126F810}"/>
-          </ac:spMkLst>
-        </pc:spChg>
-        <pc:spChg chg="add del mod">
-          <ac:chgData name="Niels Berglund" userId="6462ffc3c746bb1c" providerId="LiveId" clId="{572CFA61-6849-42BD-B1DA-93EA9D7DCECD}" dt="2025-11-01T11:12:18.745" v="160" actId="478"/>
-          <ac:spMkLst>
-            <pc:docMk/>
-            <pc:sldMk cId="465671313" sldId="261"/>
-            <ac:spMk id="17" creationId="{035BBDB3-4DC0-F1D8-C90F-D99A8169C12B}"/>
           </ac:spMkLst>
         </pc:spChg>
         <pc:spChg chg="add mod">
@@ -636,22 +442,6 @@
             <ac:spMk id="2" creationId="{8A20AAF8-CCFF-3109-3C19-47166D30559F}"/>
           </ac:spMkLst>
         </pc:spChg>
-        <pc:spChg chg="add del mod">
-          <ac:chgData name="Niels Berglund" userId="6462ffc3c746bb1c" providerId="LiveId" clId="{572CFA61-6849-42BD-B1DA-93EA9D7DCECD}" dt="2025-11-01T11:21:43.928" v="241" actId="478"/>
-          <ac:spMkLst>
-            <pc:docMk/>
-            <pc:sldMk cId="2839801116" sldId="262"/>
-            <ac:spMk id="4" creationId="{B8CFDEA7-0AA0-A661-81CB-FD1BB0F67961}"/>
-          </ac:spMkLst>
-        </pc:spChg>
-        <pc:spChg chg="del">
-          <ac:chgData name="Niels Berglund" userId="6462ffc3c746bb1c" providerId="LiveId" clId="{572CFA61-6849-42BD-B1DA-93EA9D7DCECD}" dt="2025-11-01T11:21:41.450" v="240" actId="478"/>
-          <ac:spMkLst>
-            <pc:docMk/>
-            <pc:sldMk cId="2839801116" sldId="262"/>
-            <ac:spMk id="6" creationId="{F479BE08-A15A-C452-4257-398FF685FF74}"/>
-          </ac:spMkLst>
-        </pc:spChg>
         <pc:spChg chg="mod">
           <ac:chgData name="Niels Berglund" userId="6462ffc3c746bb1c" providerId="LiveId" clId="{572CFA61-6849-42BD-B1DA-93EA9D7DCECD}" dt="2025-11-01T11:35:03.235" v="308" actId="20577"/>
           <ac:spMkLst>
@@ -681,14 +471,6 @@
             <pc:docMk/>
             <pc:sldMk cId="156162954" sldId="263"/>
             <ac:spMk id="2" creationId="{AA962FA7-9597-C5F1-7AC4-29096238F49D}"/>
-          </ac:spMkLst>
-        </pc:spChg>
-        <pc:spChg chg="add mod">
-          <ac:chgData name="Niels Berglund" userId="6462ffc3c746bb1c" providerId="LiveId" clId="{572CFA61-6849-42BD-B1DA-93EA9D7DCECD}" dt="2025-11-01T11:34:39.993" v="304"/>
-          <ac:spMkLst>
-            <pc:docMk/>
-            <pc:sldMk cId="156162954" sldId="263"/>
-            <ac:spMk id="3" creationId="{A3A5C08C-6672-C99E-200D-4A476F9C573F}"/>
           </ac:spMkLst>
         </pc:spChg>
         <pc:spChg chg="mod ord">
@@ -730,36 +512,12 @@
             <ac:spMk id="2" creationId="{D535998D-4277-DE5E-EABF-6DE51048015D}"/>
           </ac:spMkLst>
         </pc:spChg>
-        <pc:spChg chg="add del">
-          <ac:chgData name="Niels Berglund" userId="6462ffc3c746bb1c" providerId="LiveId" clId="{572CFA61-6849-42BD-B1DA-93EA9D7DCECD}" dt="2025-11-01T11:56:04.365" v="368" actId="478"/>
-          <ac:spMkLst>
-            <pc:docMk/>
-            <pc:sldMk cId="2328144897" sldId="264"/>
-            <ac:spMk id="3" creationId="{F0F1EDE5-FF9F-DE23-206E-6AF3F5C58455}"/>
-          </ac:spMkLst>
-        </pc:spChg>
-        <pc:spChg chg="add del mod">
-          <ac:chgData name="Niels Berglund" userId="6462ffc3c746bb1c" providerId="LiveId" clId="{572CFA61-6849-42BD-B1DA-93EA9D7DCECD}" dt="2025-11-01T11:56:56.864" v="371" actId="478"/>
-          <ac:spMkLst>
-            <pc:docMk/>
-            <pc:sldMk cId="2328144897" sldId="264"/>
-            <ac:spMk id="4" creationId="{3B3CBDA2-49E3-1429-1B55-72C098B81498}"/>
-          </ac:spMkLst>
-        </pc:spChg>
         <pc:spChg chg="add mod">
           <ac:chgData name="Niels Berglund" userId="6462ffc3c746bb1c" providerId="LiveId" clId="{572CFA61-6849-42BD-B1DA-93EA9D7DCECD}" dt="2025-11-01T12:05:10.944" v="626" actId="207"/>
           <ac:spMkLst>
             <pc:docMk/>
             <pc:sldMk cId="2328144897" sldId="264"/>
             <ac:spMk id="5" creationId="{AC9B4D44-2D85-B13A-CE4D-5E7B47B70B46}"/>
-          </ac:spMkLst>
-        </pc:spChg>
-        <pc:spChg chg="add del mod">
-          <ac:chgData name="Niels Berglund" userId="6462ffc3c746bb1c" providerId="LiveId" clId="{572CFA61-6849-42BD-B1DA-93EA9D7DCECD}" dt="2025-11-01T12:01:32.703" v="516" actId="478"/>
-          <ac:spMkLst>
-            <pc:docMk/>
-            <pc:sldMk cId="2328144897" sldId="264"/>
-            <ac:spMk id="6" creationId="{1272915D-3A59-A006-9A92-1D069BE46211}"/>
           </ac:spMkLst>
         </pc:spChg>
         <pc:spChg chg="add mod">
@@ -778,78 +536,6 @@
             <ac:spMk id="8" creationId="{4621B28D-C0E6-9999-8137-CE577A140E5E}"/>
           </ac:spMkLst>
         </pc:spChg>
-        <pc:spChg chg="del">
-          <ac:chgData name="Niels Berglund" userId="6462ffc3c746bb1c" providerId="LiveId" clId="{572CFA61-6849-42BD-B1DA-93EA9D7DCECD}" dt="2025-11-01T11:47:10.016" v="366" actId="478"/>
-          <ac:spMkLst>
-            <pc:docMk/>
-            <pc:sldMk cId="2328144897" sldId="264"/>
-            <ac:spMk id="18" creationId="{BBF5788C-9EA8-ABBC-D2B5-155F5A3AB5E6}"/>
-          </ac:spMkLst>
-        </pc:spChg>
-        <pc:spChg chg="del">
-          <ac:chgData name="Niels Berglund" userId="6462ffc3c746bb1c" providerId="LiveId" clId="{572CFA61-6849-42BD-B1DA-93EA9D7DCECD}" dt="2025-11-01T11:47:10.016" v="366" actId="478"/>
-          <ac:spMkLst>
-            <pc:docMk/>
-            <pc:sldMk cId="2328144897" sldId="264"/>
-            <ac:spMk id="19" creationId="{2CBA84B7-90FF-9C01-8691-275E359D22F5}"/>
-          </ac:spMkLst>
-        </pc:spChg>
-        <pc:spChg chg="del">
-          <ac:chgData name="Niels Berglund" userId="6462ffc3c746bb1c" providerId="LiveId" clId="{572CFA61-6849-42BD-B1DA-93EA9D7DCECD}" dt="2025-11-01T11:47:10.016" v="366" actId="478"/>
-          <ac:spMkLst>
-            <pc:docMk/>
-            <pc:sldMk cId="2328144897" sldId="264"/>
-            <ac:spMk id="20" creationId="{22AD8ED0-BEE3-6748-179D-8C319A423EA7}"/>
-          </ac:spMkLst>
-        </pc:spChg>
-        <pc:spChg chg="del">
-          <ac:chgData name="Niels Berglund" userId="6462ffc3c746bb1c" providerId="LiveId" clId="{572CFA61-6849-42BD-B1DA-93EA9D7DCECD}" dt="2025-11-01T11:47:10.016" v="366" actId="478"/>
-          <ac:spMkLst>
-            <pc:docMk/>
-            <pc:sldMk cId="2328144897" sldId="264"/>
-            <ac:spMk id="27" creationId="{FA6437F7-8128-D606-2E61-2F7962A6EBEF}"/>
-          </ac:spMkLst>
-        </pc:spChg>
-        <pc:spChg chg="del">
-          <ac:chgData name="Niels Berglund" userId="6462ffc3c746bb1c" providerId="LiveId" clId="{572CFA61-6849-42BD-B1DA-93EA9D7DCECD}" dt="2025-11-01T11:47:10.016" v="366" actId="478"/>
-          <ac:spMkLst>
-            <pc:docMk/>
-            <pc:sldMk cId="2328144897" sldId="264"/>
-            <ac:spMk id="28" creationId="{879DD89A-957E-D616-7F2B-CBB612E52AD3}"/>
-          </ac:spMkLst>
-        </pc:spChg>
-        <pc:spChg chg="del">
-          <ac:chgData name="Niels Berglund" userId="6462ffc3c746bb1c" providerId="LiveId" clId="{572CFA61-6849-42BD-B1DA-93EA9D7DCECD}" dt="2025-11-01T11:47:10.016" v="366" actId="478"/>
-          <ac:spMkLst>
-            <pc:docMk/>
-            <pc:sldMk cId="2328144897" sldId="264"/>
-            <ac:spMk id="29" creationId="{3AB8B948-2554-BC34-5100-A28CDC9CD1C3}"/>
-          </ac:spMkLst>
-        </pc:spChg>
-        <pc:spChg chg="del">
-          <ac:chgData name="Niels Berglund" userId="6462ffc3c746bb1c" providerId="LiveId" clId="{572CFA61-6849-42BD-B1DA-93EA9D7DCECD}" dt="2025-11-01T11:47:10.016" v="366" actId="478"/>
-          <ac:spMkLst>
-            <pc:docMk/>
-            <pc:sldMk cId="2328144897" sldId="264"/>
-            <ac:spMk id="30" creationId="{105938D0-3958-E170-8D2B-54A8EA9A1D97}"/>
-          </ac:spMkLst>
-        </pc:spChg>
-        <pc:grpChg chg="del">
-          <ac:chgData name="Niels Berglund" userId="6462ffc3c746bb1c" providerId="LiveId" clId="{572CFA61-6849-42BD-B1DA-93EA9D7DCECD}" dt="2025-11-01T11:47:10.016" v="366" actId="478"/>
-          <ac:grpSpMkLst>
-            <pc:docMk/>
-            <pc:sldMk cId="2328144897" sldId="264"/>
-            <ac:grpSpMk id="23" creationId="{146C9BCC-4D14-BC00-9CC8-5BA933DFB1CB}"/>
-          </ac:grpSpMkLst>
-        </pc:grpChg>
-        <pc:grpChg chg="del">
-          <ac:chgData name="Niels Berglund" userId="6462ffc3c746bb1c" providerId="LiveId" clId="{572CFA61-6849-42BD-B1DA-93EA9D7DCECD}" dt="2025-11-01T11:47:10.016" v="366" actId="478"/>
-          <ac:grpSpMkLst>
-            <pc:docMk/>
-            <pc:sldMk cId="2328144897" sldId="264"/>
-            <ac:grpSpMk id="24" creationId="{712D9B1C-9165-673C-240B-C8BEAAB5E918}"/>
-          </ac:grpSpMkLst>
-        </pc:grpChg>
         <pc:picChg chg="add mod ord">
           <ac:chgData name="Niels Berglund" userId="6462ffc3c746bb1c" providerId="LiveId" clId="{572CFA61-6849-42BD-B1DA-93EA9D7DCECD}" dt="2025-11-01T12:51:21.685" v="753" actId="167"/>
           <ac:picMkLst>
@@ -874,14 +560,6 @@
             <ac:cxnSpMk id="11" creationId="{BB15B4B5-0784-70AC-E43D-3C46EF6FDBB1}"/>
           </ac:cxnSpMkLst>
         </pc:cxnChg>
-        <pc:cxnChg chg="del mod">
-          <ac:chgData name="Niels Berglund" userId="6462ffc3c746bb1c" providerId="LiveId" clId="{572CFA61-6849-42BD-B1DA-93EA9D7DCECD}" dt="2025-11-01T11:47:10.016" v="366" actId="478"/>
-          <ac:cxnSpMkLst>
-            <pc:docMk/>
-            <pc:sldMk cId="2328144897" sldId="264"/>
-            <ac:cxnSpMk id="33" creationId="{631D31C4-B23A-7BAA-C06B-0BD9D9042891}"/>
-          </ac:cxnSpMkLst>
-        </pc:cxnChg>
       </pc:sldChg>
       <pc:sldChg chg="addSp delSp modSp new mod modClrScheme chgLayout">
         <pc:chgData name="Niels Berglund" userId="6462ffc3c746bb1c" providerId="LiveId" clId="{572CFA61-6849-42BD-B1DA-93EA9D7DCECD}" dt="2025-11-01T12:51:33.672" v="757" actId="167"/>
@@ -889,46 +567,6 @@
           <pc:docMk/>
           <pc:sldMk cId="1280766974" sldId="265"/>
         </pc:sldMkLst>
-        <pc:spChg chg="del mod ord">
-          <ac:chgData name="Niels Berglund" userId="6462ffc3c746bb1c" providerId="LiveId" clId="{572CFA61-6849-42BD-B1DA-93EA9D7DCECD}" dt="2025-11-01T12:25:51.597" v="628" actId="700"/>
-          <ac:spMkLst>
-            <pc:docMk/>
-            <pc:sldMk cId="1280766974" sldId="265"/>
-            <ac:spMk id="2" creationId="{415A74B1-36AA-35BB-B53E-6E44D5390D70}"/>
-          </ac:spMkLst>
-        </pc:spChg>
-        <pc:spChg chg="del">
-          <ac:chgData name="Niels Berglund" userId="6462ffc3c746bb1c" providerId="LiveId" clId="{572CFA61-6849-42BD-B1DA-93EA9D7DCECD}" dt="2025-11-01T12:25:51.597" v="628" actId="700"/>
-          <ac:spMkLst>
-            <pc:docMk/>
-            <pc:sldMk cId="1280766974" sldId="265"/>
-            <ac:spMk id="3" creationId="{763228FD-5BD9-16B5-A2AF-483E33847B1F}"/>
-          </ac:spMkLst>
-        </pc:spChg>
-        <pc:spChg chg="del mod ord">
-          <ac:chgData name="Niels Berglund" userId="6462ffc3c746bb1c" providerId="LiveId" clId="{572CFA61-6849-42BD-B1DA-93EA9D7DCECD}" dt="2025-11-01T12:25:51.597" v="628" actId="700"/>
-          <ac:spMkLst>
-            <pc:docMk/>
-            <pc:sldMk cId="1280766974" sldId="265"/>
-            <ac:spMk id="4" creationId="{DDC3C6F1-9B66-3CFF-2B3C-216F477A907E}"/>
-          </ac:spMkLst>
-        </pc:spChg>
-        <pc:spChg chg="del">
-          <ac:chgData name="Niels Berglund" userId="6462ffc3c746bb1c" providerId="LiveId" clId="{572CFA61-6849-42BD-B1DA-93EA9D7DCECD}" dt="2025-11-01T12:25:51.597" v="628" actId="700"/>
-          <ac:spMkLst>
-            <pc:docMk/>
-            <pc:sldMk cId="1280766974" sldId="265"/>
-            <ac:spMk id="5" creationId="{5CE155C3-D843-798B-ECD4-B1089E6DC3DD}"/>
-          </ac:spMkLst>
-        </pc:spChg>
-        <pc:spChg chg="del">
-          <ac:chgData name="Niels Berglund" userId="6462ffc3c746bb1c" providerId="LiveId" clId="{572CFA61-6849-42BD-B1DA-93EA9D7DCECD}" dt="2025-11-01T12:25:51.597" v="628" actId="700"/>
-          <ac:spMkLst>
-            <pc:docMk/>
-            <pc:sldMk cId="1280766974" sldId="265"/>
-            <ac:spMk id="6" creationId="{F4C3281A-D4EB-039B-602E-3E35EB228BA8}"/>
-          </ac:spMkLst>
-        </pc:spChg>
         <pc:spChg chg="add mod ord">
           <ac:chgData name="Niels Berglund" userId="6462ffc3c746bb1c" providerId="LiveId" clId="{572CFA61-6849-42BD-B1DA-93EA9D7DCECD}" dt="2025-11-01T12:26:27.179" v="660" actId="20577"/>
           <ac:spMkLst>
@@ -954,31 +592,8 @@
           </ac:picMkLst>
         </pc:picChg>
       </pc:sldChg>
-      <pc:sldChg chg="modSp add del mod">
-        <pc:chgData name="Niels Berglund" userId="6462ffc3c746bb1c" providerId="LiveId" clId="{572CFA61-6849-42BD-B1DA-93EA9D7DCECD}" dt="2025-11-01T12:30:20.244" v="669" actId="2696"/>
-        <pc:sldMkLst>
-          <pc:docMk/>
-          <pc:sldMk cId="641105780" sldId="266"/>
-        </pc:sldMkLst>
-        <pc:spChg chg="mod">
-          <ac:chgData name="Niels Berglund" userId="6462ffc3c746bb1c" providerId="LiveId" clId="{572CFA61-6849-42BD-B1DA-93EA9D7DCECD}" dt="2025-11-01T12:29:40.809" v="664"/>
-          <ac:spMkLst>
-            <pc:docMk/>
-            <pc:sldMk cId="641105780" sldId="266"/>
-            <ac:spMk id="7" creationId="{99F0704D-E1A6-735C-5045-E3033B7DDD0F}"/>
-          </ac:spMkLst>
-        </pc:spChg>
-        <pc:spChg chg="mod">
-          <ac:chgData name="Niels Berglund" userId="6462ffc3c746bb1c" providerId="LiveId" clId="{572CFA61-6849-42BD-B1DA-93EA9D7DCECD}" dt="2025-11-01T12:30:11.285" v="668" actId="20577"/>
-          <ac:spMkLst>
-            <pc:docMk/>
-            <pc:sldMk cId="641105780" sldId="266"/>
-            <ac:spMk id="8" creationId="{8F11D1F1-C3E3-CDA2-A841-D1E976DDBFB2}"/>
-          </ac:spMkLst>
-        </pc:spChg>
-      </pc:sldChg>
       <pc:sldChg chg="modSp add mod">
-        <pc:chgData name="Niels Berglund" userId="6462ffc3c746bb1c" providerId="LiveId" clId="{572CFA61-6849-42BD-B1DA-93EA9D7DCECD}" dt="2025-11-01T13:08:53.819" v="948" actId="6549"/>
+        <pc:chgData name="Niels Berglund" userId="6462ffc3c746bb1c" providerId="LiveId" clId="{572CFA61-6849-42BD-B1DA-93EA9D7DCECD}" dt="2025-11-20T10:33:18.017" v="1247" actId="20577"/>
         <pc:sldMkLst>
           <pc:docMk/>
           <pc:sldMk cId="1006093960" sldId="266"/>
@@ -992,7 +607,7 @@
           </ac:spMkLst>
         </pc:spChg>
         <pc:spChg chg="mod">
-          <ac:chgData name="Niels Berglund" userId="6462ffc3c746bb1c" providerId="LiveId" clId="{572CFA61-6849-42BD-B1DA-93EA9D7DCECD}" dt="2025-11-01T13:08:53.819" v="948" actId="6549"/>
+          <ac:chgData name="Niels Berglund" userId="6462ffc3c746bb1c" providerId="LiveId" clId="{572CFA61-6849-42BD-B1DA-93EA9D7DCECD}" dt="2025-11-20T10:33:18.017" v="1247" actId="20577"/>
           <ac:spMkLst>
             <pc:docMk/>
             <pc:sldMk cId="1006093960" sldId="266"/>
@@ -1001,7 +616,7 @@
         </pc:spChg>
       </pc:sldChg>
       <pc:sldChg chg="modSp add mod">
-        <pc:chgData name="Niels Berglund" userId="6462ffc3c746bb1c" providerId="LiveId" clId="{572CFA61-6849-42BD-B1DA-93EA9D7DCECD}" dt="2025-11-01T13:12:24.179" v="1181" actId="5793"/>
+        <pc:chgData name="Niels Berglund" userId="6462ffc3c746bb1c" providerId="LiveId" clId="{572CFA61-6849-42BD-B1DA-93EA9D7DCECD}" dt="2025-11-20T10:33:49.792" v="1251" actId="20577"/>
         <pc:sldMkLst>
           <pc:docMk/>
           <pc:sldMk cId="441496072" sldId="267"/>
@@ -1015,7 +630,7 @@
           </ac:spMkLst>
         </pc:spChg>
         <pc:spChg chg="mod">
-          <ac:chgData name="Niels Berglund" userId="6462ffc3c746bb1c" providerId="LiveId" clId="{572CFA61-6849-42BD-B1DA-93EA9D7DCECD}" dt="2025-11-01T13:12:24.179" v="1181" actId="5793"/>
+          <ac:chgData name="Niels Berglund" userId="6462ffc3c746bb1c" providerId="LiveId" clId="{572CFA61-6849-42BD-B1DA-93EA9D7DCECD}" dt="2025-11-20T10:33:49.792" v="1251" actId="20577"/>
           <ac:spMkLst>
             <pc:docMk/>
             <pc:sldMk cId="441496072" sldId="267"/>
@@ -1023,21 +638,14 @@
           </ac:spMkLst>
         </pc:spChg>
       </pc:sldChg>
-      <pc:sldChg chg="add del">
-        <pc:chgData name="Niels Berglund" userId="6462ffc3c746bb1c" providerId="LiveId" clId="{572CFA61-6849-42BD-B1DA-93EA9D7DCECD}" dt="2025-11-01T13:15:41.090" v="1194" actId="47"/>
-        <pc:sldMkLst>
-          <pc:docMk/>
-          <pc:sldMk cId="1849699014" sldId="268"/>
-        </pc:sldMkLst>
-      </pc:sldChg>
       <pc:sldChg chg="addSp delSp modSp add mod">
-        <pc:chgData name="Niels Berglund" userId="6462ffc3c746bb1c" providerId="LiveId" clId="{572CFA61-6849-42BD-B1DA-93EA9D7DCECD}" dt="2025-11-01T13:18:14.609" v="1206" actId="1076"/>
+        <pc:chgData name="Niels Berglund" userId="6462ffc3c746bb1c" providerId="LiveId" clId="{572CFA61-6849-42BD-B1DA-93EA9D7DCECD}" dt="2025-11-20T10:29:23.108" v="1243" actId="14100"/>
         <pc:sldMkLst>
           <pc:docMk/>
           <pc:sldMk cId="1644626494" sldId="342"/>
         </pc:sldMkLst>
         <pc:spChg chg="mod">
-          <ac:chgData name="Niels Berglund" userId="6462ffc3c746bb1c" providerId="LiveId" clId="{572CFA61-6849-42BD-B1DA-93EA9D7DCECD}" dt="2025-11-01T13:18:14.105" v="1205" actId="207"/>
+          <ac:chgData name="Niels Berglund" userId="6462ffc3c746bb1c" providerId="LiveId" clId="{572CFA61-6849-42BD-B1DA-93EA9D7DCECD}" dt="2025-11-20T10:29:18.222" v="1241" actId="1076"/>
           <ac:spMkLst>
             <pc:docMk/>
             <pc:sldMk cId="1644626494" sldId="342"/>
@@ -1052,16 +660,8 @@
             <ac:spMk id="18" creationId="{4EE5CCFA-2CF9-A362-D6F0-7147937F805A}"/>
           </ac:spMkLst>
         </pc:spChg>
-        <pc:picChg chg="del">
-          <ac:chgData name="Niels Berglund" userId="6462ffc3c746bb1c" providerId="LiveId" clId="{572CFA61-6849-42BD-B1DA-93EA9D7DCECD}" dt="2025-11-01T13:17:54.963" v="1199" actId="478"/>
-          <ac:picMkLst>
-            <pc:docMk/>
-            <pc:sldMk cId="1644626494" sldId="342"/>
-            <ac:picMk id="2" creationId="{897CACFD-48C6-7D8D-90C9-4C39DA15BDCA}"/>
-          </ac:picMkLst>
-        </pc:picChg>
         <pc:picChg chg="add mod ord">
-          <ac:chgData name="Niels Berglund" userId="6462ffc3c746bb1c" providerId="LiveId" clId="{572CFA61-6849-42BD-B1DA-93EA9D7DCECD}" dt="2025-11-01T13:18:14.609" v="1206" actId="1076"/>
+          <ac:chgData name="Niels Berglund" userId="6462ffc3c746bb1c" providerId="LiveId" clId="{572CFA61-6849-42BD-B1DA-93EA9D7DCECD}" dt="2025-11-20T10:29:23.108" v="1243" actId="14100"/>
           <ac:picMkLst>
             <pc:docMk/>
             <pc:sldMk cId="1644626494" sldId="342"/>
@@ -1091,14 +691,6 @@
             <ac:spMk id="9" creationId="{A3585BD4-A4EA-302D-A762-84ACEA203E74}"/>
           </ac:spMkLst>
         </pc:spChg>
-        <pc:picChg chg="del">
-          <ac:chgData name="Niels Berglund" userId="6462ffc3c746bb1c" providerId="LiveId" clId="{572CFA61-6849-42BD-B1DA-93EA9D7DCECD}" dt="2025-11-01T13:14:44.453" v="1186" actId="478"/>
-          <ac:picMkLst>
-            <pc:docMk/>
-            <pc:sldMk cId="2724713371" sldId="348"/>
-            <ac:picMk id="2" creationId="{4A2A6AE2-7B2B-9FA3-5F83-BF7848401660}"/>
-          </ac:picMkLst>
-        </pc:picChg>
         <pc:picChg chg="add mod ord">
           <ac:chgData name="Niels Berglund" userId="6462ffc3c746bb1c" providerId="LiveId" clId="{572CFA61-6849-42BD-B1DA-93EA9D7DCECD}" dt="2025-11-01T13:15:33.332" v="1193" actId="1076"/>
           <ac:picMkLst>
@@ -1195,7 +787,7 @@
           <a:p>
             <a:fld id="{C01FF5A2-7221-4D0A-BA7E-3E97D457CE20}" type="datetimeFigureOut">
               <a:rPr lang="en-US" smtClean="0"/>
-              <a:t>2025-11-01</a:t>
+              <a:t>2025-11-20</a:t>
             </a:fld>
             <a:endParaRPr lang="en-US"/>
           </a:p>
@@ -1917,7 +1509,7 @@
           <a:p>
             <a:fld id="{2C846FF3-5801-4186-ADA5-4C3C17C77B4C}" type="datetimeFigureOut">
               <a:rPr lang="en-US" smtClean="0"/>
-              <a:t>2025-11-01</a:t>
+              <a:t>2025-11-20</a:t>
             </a:fld>
             <a:endParaRPr lang="en-US"/>
           </a:p>
@@ -2115,7 +1707,7 @@
           <a:p>
             <a:fld id="{2C846FF3-5801-4186-ADA5-4C3C17C77B4C}" type="datetimeFigureOut">
               <a:rPr lang="en-US" smtClean="0"/>
-              <a:t>2025-11-01</a:t>
+              <a:t>2025-11-20</a:t>
             </a:fld>
             <a:endParaRPr lang="en-US"/>
           </a:p>
@@ -2323,7 +1915,7 @@
           <a:p>
             <a:fld id="{2C846FF3-5801-4186-ADA5-4C3C17C77B4C}" type="datetimeFigureOut">
               <a:rPr lang="en-US" smtClean="0"/>
-              <a:t>2025-11-01</a:t>
+              <a:t>2025-11-20</a:t>
             </a:fld>
             <a:endParaRPr lang="en-US"/>
           </a:p>
@@ -2543,7 +2135,7 @@
           <a:p>
             <a:fld id="{35E7EF3B-1460-4EE6-BB1F-95D983DE5504}" type="datetimeFigureOut">
               <a:rPr lang="en-US" smtClean="0"/>
-              <a:t>2025-11-01</a:t>
+              <a:t>2025-11-20</a:t>
             </a:fld>
             <a:endParaRPr lang="en-US"/>
           </a:p>
@@ -2741,7 +2333,7 @@
           <a:p>
             <a:fld id="{35E7EF3B-1460-4EE6-BB1F-95D983DE5504}" type="datetimeFigureOut">
               <a:rPr lang="en-US" smtClean="0"/>
-              <a:t>2025-11-01</a:t>
+              <a:t>2025-11-20</a:t>
             </a:fld>
             <a:endParaRPr lang="en-US"/>
           </a:p>
@@ -3016,7 +2608,7 @@
           <a:p>
             <a:fld id="{35E7EF3B-1460-4EE6-BB1F-95D983DE5504}" type="datetimeFigureOut">
               <a:rPr lang="en-US" smtClean="0"/>
-              <a:t>2025-11-01</a:t>
+              <a:t>2025-11-20</a:t>
             </a:fld>
             <a:endParaRPr lang="en-US"/>
           </a:p>
@@ -3281,7 +2873,7 @@
           <a:p>
             <a:fld id="{35E7EF3B-1460-4EE6-BB1F-95D983DE5504}" type="datetimeFigureOut">
               <a:rPr lang="en-US" smtClean="0"/>
-              <a:t>2025-11-01</a:t>
+              <a:t>2025-11-20</a:t>
             </a:fld>
             <a:endParaRPr lang="en-US"/>
           </a:p>
@@ -3693,7 +3285,7 @@
           <a:p>
             <a:fld id="{35E7EF3B-1460-4EE6-BB1F-95D983DE5504}" type="datetimeFigureOut">
               <a:rPr lang="en-US" smtClean="0"/>
-              <a:t>2025-11-01</a:t>
+              <a:t>2025-11-20</a:t>
             </a:fld>
             <a:endParaRPr lang="en-US"/>
           </a:p>
@@ -3834,7 +3426,7 @@
           <a:p>
             <a:fld id="{35E7EF3B-1460-4EE6-BB1F-95D983DE5504}" type="datetimeFigureOut">
               <a:rPr lang="en-US" smtClean="0"/>
-              <a:t>2025-11-01</a:t>
+              <a:t>2025-11-20</a:t>
             </a:fld>
             <a:endParaRPr lang="en-US"/>
           </a:p>
@@ -3947,7 +3539,7 @@
           <a:p>
             <a:fld id="{35E7EF3B-1460-4EE6-BB1F-95D983DE5504}" type="datetimeFigureOut">
               <a:rPr lang="en-US" smtClean="0"/>
-              <a:t>2025-11-01</a:t>
+              <a:t>2025-11-20</a:t>
             </a:fld>
             <a:endParaRPr lang="en-US"/>
           </a:p>
@@ -4258,7 +3850,7 @@
           <a:p>
             <a:fld id="{35E7EF3B-1460-4EE6-BB1F-95D983DE5504}" type="datetimeFigureOut">
               <a:rPr lang="en-US" smtClean="0"/>
-              <a:t>2025-11-01</a:t>
+              <a:t>2025-11-20</a:t>
             </a:fld>
             <a:endParaRPr lang="en-US"/>
           </a:p>
@@ -4456,7 +4048,7 @@
           <a:p>
             <a:fld id="{2C846FF3-5801-4186-ADA5-4C3C17C77B4C}" type="datetimeFigureOut">
               <a:rPr lang="en-US" smtClean="0"/>
-              <a:t>2025-11-01</a:t>
+              <a:t>2025-11-20</a:t>
             </a:fld>
             <a:endParaRPr lang="en-US"/>
           </a:p>
@@ -4744,7 +4336,7 @@
           <a:p>
             <a:fld id="{35E7EF3B-1460-4EE6-BB1F-95D983DE5504}" type="datetimeFigureOut">
               <a:rPr lang="en-US" smtClean="0"/>
-              <a:t>2025-11-01</a:t>
+              <a:t>2025-11-20</a:t>
             </a:fld>
             <a:endParaRPr lang="en-US"/>
           </a:p>
@@ -4942,7 +4534,7 @@
           <a:p>
             <a:fld id="{35E7EF3B-1460-4EE6-BB1F-95D983DE5504}" type="datetimeFigureOut">
               <a:rPr lang="en-US" smtClean="0"/>
-              <a:t>2025-11-01</a:t>
+              <a:t>2025-11-20</a:t>
             </a:fld>
             <a:endParaRPr lang="en-US"/>
           </a:p>
@@ -5150,7 +4742,7 @@
           <a:p>
             <a:fld id="{35E7EF3B-1460-4EE6-BB1F-95D983DE5504}" type="datetimeFigureOut">
               <a:rPr lang="en-US" smtClean="0"/>
-              <a:t>2025-11-01</a:t>
+              <a:t>2025-11-20</a:t>
             </a:fld>
             <a:endParaRPr lang="en-US"/>
           </a:p>
@@ -5498,7 +5090,7 @@
           <a:p>
             <a:fld id="{2C846FF3-5801-4186-ADA5-4C3C17C77B4C}" type="datetimeFigureOut">
               <a:rPr lang="en-US" smtClean="0"/>
-              <a:t>2025-11-01</a:t>
+              <a:t>2025-11-20</a:t>
             </a:fld>
             <a:endParaRPr lang="en-US"/>
           </a:p>
@@ -5763,7 +5355,7 @@
           <a:p>
             <a:fld id="{2C846FF3-5801-4186-ADA5-4C3C17C77B4C}" type="datetimeFigureOut">
               <a:rPr lang="en-US" smtClean="0"/>
-              <a:t>2025-11-01</a:t>
+              <a:t>2025-11-20</a:t>
             </a:fld>
             <a:endParaRPr lang="en-US"/>
           </a:p>
@@ -6175,7 +5767,7 @@
           <a:p>
             <a:fld id="{2C846FF3-5801-4186-ADA5-4C3C17C77B4C}" type="datetimeFigureOut">
               <a:rPr lang="en-US" smtClean="0"/>
-              <a:t>2025-11-01</a:t>
+              <a:t>2025-11-20</a:t>
             </a:fld>
             <a:endParaRPr lang="en-US"/>
           </a:p>
@@ -6316,7 +5908,7 @@
           <a:p>
             <a:fld id="{2C846FF3-5801-4186-ADA5-4C3C17C77B4C}" type="datetimeFigureOut">
               <a:rPr lang="en-US" smtClean="0"/>
-              <a:t>2025-11-01</a:t>
+              <a:t>2025-11-20</a:t>
             </a:fld>
             <a:endParaRPr lang="en-US"/>
           </a:p>
@@ -6429,7 +6021,7 @@
           <a:p>
             <a:fld id="{2C846FF3-5801-4186-ADA5-4C3C17C77B4C}" type="datetimeFigureOut">
               <a:rPr lang="en-US" smtClean="0"/>
-              <a:t>2025-11-01</a:t>
+              <a:t>2025-11-20</a:t>
             </a:fld>
             <a:endParaRPr lang="en-US"/>
           </a:p>
@@ -6740,7 +6332,7 @@
           <a:p>
             <a:fld id="{2C846FF3-5801-4186-ADA5-4C3C17C77B4C}" type="datetimeFigureOut">
               <a:rPr lang="en-US" smtClean="0"/>
-              <a:t>2025-11-01</a:t>
+              <a:t>2025-11-20</a:t>
             </a:fld>
             <a:endParaRPr lang="en-US"/>
           </a:p>
@@ -7028,7 +6620,7 @@
           <a:p>
             <a:fld id="{2C846FF3-5801-4186-ADA5-4C3C17C77B4C}" type="datetimeFigureOut">
               <a:rPr lang="en-US" smtClean="0"/>
-              <a:t>2025-11-01</a:t>
+              <a:t>2025-11-20</a:t>
             </a:fld>
             <a:endParaRPr lang="en-US"/>
           </a:p>
@@ -7269,7 +6861,7 @@
           <a:p>
             <a:fld id="{2C846FF3-5801-4186-ADA5-4C3C17C77B4C}" type="datetimeFigureOut">
               <a:rPr lang="en-US" smtClean="0"/>
-              <a:t>2025-11-01</a:t>
+              <a:t>2025-11-20</a:t>
             </a:fld>
             <a:endParaRPr lang="en-US"/>
           </a:p>
@@ -7837,7 +7429,7 @@
           <a:p>
             <a:fld id="{35E7EF3B-1460-4EE6-BB1F-95D983DE5504}" type="datetimeFigureOut">
               <a:rPr lang="en-US" smtClean="0"/>
-              <a:t>2025-11-01</a:t>
+              <a:t>2025-11-20</a:t>
             </a:fld>
             <a:endParaRPr lang="en-US"/>
           </a:p>
@@ -9004,7 +8596,7 @@
               <a:rPr lang="en-US" dirty="0">
                 <a:latin typeface="Arial Rounded MT Bold" panose="020F0704030504030204" pitchFamily="34" charset="0"/>
               </a:rPr>
-              <a:t>Lines of C# code: ~750</a:t>
+              <a:t>Lines of C# code: ~500</a:t>
             </a:r>
           </a:p>
           <a:p>
@@ -9176,10 +8768,16 @@
           </a:p>
           <a:p>
             <a:r>
+              <a:rPr lang="en-US">
+                <a:latin typeface="Arial Rounded MT Bold" panose="020F0704030504030204" pitchFamily="34" charset="0"/>
+              </a:rPr>
+              <a:t>LLM as </a:t>
+            </a:r>
+            <a:r>
               <a:rPr lang="en-US" dirty="0">
                 <a:latin typeface="Arial Rounded MT Bold" panose="020F0704030504030204" pitchFamily="34" charset="0"/>
               </a:rPr>
-              <a:t>Azure AI as Orchestrator: Let it handle the tool selection</a:t>
+              <a:t>Orchestrator: Let it handle the tool selection</a:t>
             </a:r>
           </a:p>
           <a:p>
@@ -9804,8 +9402,8 @@
         </p:blipFill>
         <p:spPr>
           <a:xfrm>
-            <a:off x="0" y="-90721"/>
-            <a:ext cx="12192000" cy="6849438"/>
+            <a:off x="0" y="-299348"/>
+            <a:ext cx="12192000" cy="7157348"/>
           </a:xfrm>
           <a:prstGeom prst="rect">
             <a:avLst/>
@@ -9913,7 +9511,7 @@
         </p:nvSpPr>
         <p:spPr>
           <a:xfrm>
-            <a:off x="2613102" y="2751892"/>
+            <a:off x="2613102" y="2716622"/>
             <a:ext cx="6965796" cy="677108"/>
           </a:xfrm>
           <a:prstGeom prst="rect">

</xml_diff>

<commit_message>
Deck for .NET Conf.
</commit_message>
<xml_diff>
--- a/DotNet-Conf/deck/dotnet-mcp.pptx
+++ b/DotNet-Conf/deck/dotnet-mcp.pptx
@@ -6,22 +6,23 @@
     <p:sldMasterId id="2147483660" r:id="rId2"/>
   </p:sldMasterIdLst>
   <p:notesMasterIdLst>
-    <p:notesMasterId r:id="rId16"/>
+    <p:notesMasterId r:id="rId17"/>
   </p:notesMasterIdLst>
   <p:sldIdLst>
     <p:sldId id="256" r:id="rId3"/>
-    <p:sldId id="342" r:id="rId4"/>
-    <p:sldId id="257" r:id="rId5"/>
-    <p:sldId id="259" r:id="rId6"/>
-    <p:sldId id="260" r:id="rId7"/>
-    <p:sldId id="261" r:id="rId8"/>
-    <p:sldId id="262" r:id="rId9"/>
-    <p:sldId id="263" r:id="rId10"/>
-    <p:sldId id="264" r:id="rId11"/>
-    <p:sldId id="265" r:id="rId12"/>
-    <p:sldId id="266" r:id="rId13"/>
-    <p:sldId id="267" r:id="rId14"/>
-    <p:sldId id="348" r:id="rId15"/>
+    <p:sldId id="349" r:id="rId4"/>
+    <p:sldId id="342" r:id="rId5"/>
+    <p:sldId id="257" r:id="rId6"/>
+    <p:sldId id="259" r:id="rId7"/>
+    <p:sldId id="260" r:id="rId8"/>
+    <p:sldId id="261" r:id="rId9"/>
+    <p:sldId id="262" r:id="rId10"/>
+    <p:sldId id="263" r:id="rId11"/>
+    <p:sldId id="264" r:id="rId12"/>
+    <p:sldId id="265" r:id="rId13"/>
+    <p:sldId id="266" r:id="rId14"/>
+    <p:sldId id="267" r:id="rId15"/>
+    <p:sldId id="348" r:id="rId16"/>
   </p:sldIdLst>
   <p:sldSz cx="12192000" cy="6858000"/>
   <p:notesSz cx="6858000" cy="9144000"/>
@@ -133,7 +134,7 @@
   <pc:docChgLst>
     <pc:chgData name="Niels Berglund" userId="6462ffc3c746bb1c" providerId="LiveId" clId="{572CFA61-6849-42BD-B1DA-93EA9D7DCECD}"/>
     <pc:docChg chg="undo redo custSel addSld delSld modSld">
-      <pc:chgData name="Niels Berglund" userId="6462ffc3c746bb1c" providerId="LiveId" clId="{572CFA61-6849-42BD-B1DA-93EA9D7DCECD}" dt="2025-11-20T10:33:49.792" v="1251" actId="20577"/>
+      <pc:chgData name="Niels Berglund" userId="6462ffc3c746bb1c" providerId="LiveId" clId="{572CFA61-6849-42BD-B1DA-93EA9D7DCECD}" dt="2025-11-21T06:17:57.849" v="1257" actId="14100"/>
       <pc:docMkLst>
         <pc:docMk/>
       </pc:docMkLst>
@@ -700,6 +701,29 @@
           </ac:picMkLst>
         </pc:picChg>
       </pc:sldChg>
+      <pc:sldChg chg="addSp delSp modSp new mod">
+        <pc:chgData name="Niels Berglund" userId="6462ffc3c746bb1c" providerId="LiveId" clId="{572CFA61-6849-42BD-B1DA-93EA9D7DCECD}" dt="2025-11-21T06:17:57.849" v="1257" actId="14100"/>
+        <pc:sldMkLst>
+          <pc:docMk/>
+          <pc:sldMk cId="2813410835" sldId="349"/>
+        </pc:sldMkLst>
+        <pc:spChg chg="del">
+          <ac:chgData name="Niels Berglund" userId="6462ffc3c746bb1c" providerId="LiveId" clId="{572CFA61-6849-42BD-B1DA-93EA9D7DCECD}" dt="2025-11-21T06:17:51.495" v="1253"/>
+          <ac:spMkLst>
+            <pc:docMk/>
+            <pc:sldMk cId="2813410835" sldId="349"/>
+            <ac:spMk id="3" creationId="{3DCE38C8-386F-222A-DF62-203BBB19EC52}"/>
+          </ac:spMkLst>
+        </pc:spChg>
+        <pc:picChg chg="add mod">
+          <ac:chgData name="Niels Berglund" userId="6462ffc3c746bb1c" providerId="LiveId" clId="{572CFA61-6849-42BD-B1DA-93EA9D7DCECD}" dt="2025-11-21T06:17:57.849" v="1257" actId="14100"/>
+          <ac:picMkLst>
+            <pc:docMk/>
+            <pc:sldMk cId="2813410835" sldId="349"/>
+            <ac:picMk id="5" creationId="{66609B0F-81B9-A35C-20AB-5CB38BBEA825}"/>
+          </ac:picMkLst>
+        </pc:picChg>
+      </pc:sldChg>
     </pc:docChg>
   </pc:docChgLst>
 </pc:chgInfo>
@@ -787,7 +811,7 @@
           <a:p>
             <a:fld id="{C01FF5A2-7221-4D0A-BA7E-3E97D457CE20}" type="datetimeFigureOut">
               <a:rPr lang="en-US" smtClean="0"/>
-              <a:t>2025-11-20</a:t>
+              <a:t>2025-11-21</a:t>
             </a:fld>
             <a:endParaRPr lang="en-US"/>
           </a:p>
@@ -1186,7 +1210,7 @@
                 <a:tabLst/>
                 <a:defRPr/>
               </a:pPr>
-              <a:t>2</a:t>
+              <a:t>3</a:t>
             </a:fld>
             <a:endParaRPr kumimoji="0" lang="en-GB" sz="1200" b="0" i="0" u="none" strike="noStrike" kern="1200" cap="none" spc="0" normalizeH="0" baseline="0" noProof="0">
               <a:ln>
@@ -1330,7 +1354,7 @@
                 <a:tabLst/>
                 <a:defRPr/>
               </a:pPr>
-              <a:t>13</a:t>
+              <a:t>14</a:t>
             </a:fld>
             <a:endParaRPr kumimoji="0" lang="en-US" sz="1200" b="0" i="0" u="none" strike="noStrike" kern="1200" cap="none" spc="0" normalizeH="0" baseline="0" noProof="0">
               <a:ln>
@@ -1509,7 +1533,7 @@
           <a:p>
             <a:fld id="{2C846FF3-5801-4186-ADA5-4C3C17C77B4C}" type="datetimeFigureOut">
               <a:rPr lang="en-US" smtClean="0"/>
-              <a:t>2025-11-20</a:t>
+              <a:t>2025-11-21</a:t>
             </a:fld>
             <a:endParaRPr lang="en-US"/>
           </a:p>
@@ -1707,7 +1731,7 @@
           <a:p>
             <a:fld id="{2C846FF3-5801-4186-ADA5-4C3C17C77B4C}" type="datetimeFigureOut">
               <a:rPr lang="en-US" smtClean="0"/>
-              <a:t>2025-11-20</a:t>
+              <a:t>2025-11-21</a:t>
             </a:fld>
             <a:endParaRPr lang="en-US"/>
           </a:p>
@@ -1915,7 +1939,7 @@
           <a:p>
             <a:fld id="{2C846FF3-5801-4186-ADA5-4C3C17C77B4C}" type="datetimeFigureOut">
               <a:rPr lang="en-US" smtClean="0"/>
-              <a:t>2025-11-20</a:t>
+              <a:t>2025-11-21</a:t>
             </a:fld>
             <a:endParaRPr lang="en-US"/>
           </a:p>
@@ -2135,7 +2159,7 @@
           <a:p>
             <a:fld id="{35E7EF3B-1460-4EE6-BB1F-95D983DE5504}" type="datetimeFigureOut">
               <a:rPr lang="en-US" smtClean="0"/>
-              <a:t>2025-11-20</a:t>
+              <a:t>2025-11-21</a:t>
             </a:fld>
             <a:endParaRPr lang="en-US"/>
           </a:p>
@@ -2333,7 +2357,7 @@
           <a:p>
             <a:fld id="{35E7EF3B-1460-4EE6-BB1F-95D983DE5504}" type="datetimeFigureOut">
               <a:rPr lang="en-US" smtClean="0"/>
-              <a:t>2025-11-20</a:t>
+              <a:t>2025-11-21</a:t>
             </a:fld>
             <a:endParaRPr lang="en-US"/>
           </a:p>
@@ -2608,7 +2632,7 @@
           <a:p>
             <a:fld id="{35E7EF3B-1460-4EE6-BB1F-95D983DE5504}" type="datetimeFigureOut">
               <a:rPr lang="en-US" smtClean="0"/>
-              <a:t>2025-11-20</a:t>
+              <a:t>2025-11-21</a:t>
             </a:fld>
             <a:endParaRPr lang="en-US"/>
           </a:p>
@@ -2873,7 +2897,7 @@
           <a:p>
             <a:fld id="{35E7EF3B-1460-4EE6-BB1F-95D983DE5504}" type="datetimeFigureOut">
               <a:rPr lang="en-US" smtClean="0"/>
-              <a:t>2025-11-20</a:t>
+              <a:t>2025-11-21</a:t>
             </a:fld>
             <a:endParaRPr lang="en-US"/>
           </a:p>
@@ -3285,7 +3309,7 @@
           <a:p>
             <a:fld id="{35E7EF3B-1460-4EE6-BB1F-95D983DE5504}" type="datetimeFigureOut">
               <a:rPr lang="en-US" smtClean="0"/>
-              <a:t>2025-11-20</a:t>
+              <a:t>2025-11-21</a:t>
             </a:fld>
             <a:endParaRPr lang="en-US"/>
           </a:p>
@@ -3426,7 +3450,7 @@
           <a:p>
             <a:fld id="{35E7EF3B-1460-4EE6-BB1F-95D983DE5504}" type="datetimeFigureOut">
               <a:rPr lang="en-US" smtClean="0"/>
-              <a:t>2025-11-20</a:t>
+              <a:t>2025-11-21</a:t>
             </a:fld>
             <a:endParaRPr lang="en-US"/>
           </a:p>
@@ -3539,7 +3563,7 @@
           <a:p>
             <a:fld id="{35E7EF3B-1460-4EE6-BB1F-95D983DE5504}" type="datetimeFigureOut">
               <a:rPr lang="en-US" smtClean="0"/>
-              <a:t>2025-11-20</a:t>
+              <a:t>2025-11-21</a:t>
             </a:fld>
             <a:endParaRPr lang="en-US"/>
           </a:p>
@@ -3850,7 +3874,7 @@
           <a:p>
             <a:fld id="{35E7EF3B-1460-4EE6-BB1F-95D983DE5504}" type="datetimeFigureOut">
               <a:rPr lang="en-US" smtClean="0"/>
-              <a:t>2025-11-20</a:t>
+              <a:t>2025-11-21</a:t>
             </a:fld>
             <a:endParaRPr lang="en-US"/>
           </a:p>
@@ -4048,7 +4072,7 @@
           <a:p>
             <a:fld id="{2C846FF3-5801-4186-ADA5-4C3C17C77B4C}" type="datetimeFigureOut">
               <a:rPr lang="en-US" smtClean="0"/>
-              <a:t>2025-11-20</a:t>
+              <a:t>2025-11-21</a:t>
             </a:fld>
             <a:endParaRPr lang="en-US"/>
           </a:p>
@@ -4336,7 +4360,7 @@
           <a:p>
             <a:fld id="{35E7EF3B-1460-4EE6-BB1F-95D983DE5504}" type="datetimeFigureOut">
               <a:rPr lang="en-US" smtClean="0"/>
-              <a:t>2025-11-20</a:t>
+              <a:t>2025-11-21</a:t>
             </a:fld>
             <a:endParaRPr lang="en-US"/>
           </a:p>
@@ -4534,7 +4558,7 @@
           <a:p>
             <a:fld id="{35E7EF3B-1460-4EE6-BB1F-95D983DE5504}" type="datetimeFigureOut">
               <a:rPr lang="en-US" smtClean="0"/>
-              <a:t>2025-11-20</a:t>
+              <a:t>2025-11-21</a:t>
             </a:fld>
             <a:endParaRPr lang="en-US"/>
           </a:p>
@@ -4742,7 +4766,7 @@
           <a:p>
             <a:fld id="{35E7EF3B-1460-4EE6-BB1F-95D983DE5504}" type="datetimeFigureOut">
               <a:rPr lang="en-US" smtClean="0"/>
-              <a:t>2025-11-20</a:t>
+              <a:t>2025-11-21</a:t>
             </a:fld>
             <a:endParaRPr lang="en-US"/>
           </a:p>
@@ -5090,7 +5114,7 @@
           <a:p>
             <a:fld id="{2C846FF3-5801-4186-ADA5-4C3C17C77B4C}" type="datetimeFigureOut">
               <a:rPr lang="en-US" smtClean="0"/>
-              <a:t>2025-11-20</a:t>
+              <a:t>2025-11-21</a:t>
             </a:fld>
             <a:endParaRPr lang="en-US"/>
           </a:p>
@@ -5355,7 +5379,7 @@
           <a:p>
             <a:fld id="{2C846FF3-5801-4186-ADA5-4C3C17C77B4C}" type="datetimeFigureOut">
               <a:rPr lang="en-US" smtClean="0"/>
-              <a:t>2025-11-20</a:t>
+              <a:t>2025-11-21</a:t>
             </a:fld>
             <a:endParaRPr lang="en-US"/>
           </a:p>
@@ -5767,7 +5791,7 @@
           <a:p>
             <a:fld id="{2C846FF3-5801-4186-ADA5-4C3C17C77B4C}" type="datetimeFigureOut">
               <a:rPr lang="en-US" smtClean="0"/>
-              <a:t>2025-11-20</a:t>
+              <a:t>2025-11-21</a:t>
             </a:fld>
             <a:endParaRPr lang="en-US"/>
           </a:p>
@@ -5908,7 +5932,7 @@
           <a:p>
             <a:fld id="{2C846FF3-5801-4186-ADA5-4C3C17C77B4C}" type="datetimeFigureOut">
               <a:rPr lang="en-US" smtClean="0"/>
-              <a:t>2025-11-20</a:t>
+              <a:t>2025-11-21</a:t>
             </a:fld>
             <a:endParaRPr lang="en-US"/>
           </a:p>
@@ -6021,7 +6045,7 @@
           <a:p>
             <a:fld id="{2C846FF3-5801-4186-ADA5-4C3C17C77B4C}" type="datetimeFigureOut">
               <a:rPr lang="en-US" smtClean="0"/>
-              <a:t>2025-11-20</a:t>
+              <a:t>2025-11-21</a:t>
             </a:fld>
             <a:endParaRPr lang="en-US"/>
           </a:p>
@@ -6332,7 +6356,7 @@
           <a:p>
             <a:fld id="{2C846FF3-5801-4186-ADA5-4C3C17C77B4C}" type="datetimeFigureOut">
               <a:rPr lang="en-US" smtClean="0"/>
-              <a:t>2025-11-20</a:t>
+              <a:t>2025-11-21</a:t>
             </a:fld>
             <a:endParaRPr lang="en-US"/>
           </a:p>
@@ -6620,7 +6644,7 @@
           <a:p>
             <a:fld id="{2C846FF3-5801-4186-ADA5-4C3C17C77B4C}" type="datetimeFigureOut">
               <a:rPr lang="en-US" smtClean="0"/>
-              <a:t>2025-11-20</a:t>
+              <a:t>2025-11-21</a:t>
             </a:fld>
             <a:endParaRPr lang="en-US"/>
           </a:p>
@@ -6861,7 +6885,7 @@
           <a:p>
             <a:fld id="{2C846FF3-5801-4186-ADA5-4C3C17C77B4C}" type="datetimeFigureOut">
               <a:rPr lang="en-US" smtClean="0"/>
-              <a:t>2025-11-20</a:t>
+              <a:t>2025-11-21</a:t>
             </a:fld>
             <a:endParaRPr lang="en-US"/>
           </a:p>
@@ -7429,7 +7453,7 @@
           <a:p>
             <a:fld id="{35E7EF3B-1460-4EE6-BB1F-95D983DE5504}" type="datetimeFigureOut">
               <a:rPr lang="en-US" smtClean="0"/>
-              <a:t>2025-11-20</a:t>
+              <a:t>2025-11-21</a:t>
             </a:fld>
             <a:endParaRPr lang="en-US"/>
           </a:p>
@@ -8300,6 +8324,438 @@
   <p:cSld>
     <p:spTree>
       <p:nvGrpSpPr>
+        <p:cNvPr id="1" name="">
+          <a:extLst>
+            <a:ext uri="{FF2B5EF4-FFF2-40B4-BE49-F238E27FC236}">
+              <a16:creationId xmlns:a16="http://schemas.microsoft.com/office/drawing/2014/main" id="{C388E8A5-BD65-7336-7770-6E8D27EE2117}"/>
+            </a:ext>
+          </a:extLst>
+        </p:cNvPr>
+        <p:cNvGrpSpPr/>
+        <p:nvPr/>
+      </p:nvGrpSpPr>
+      <p:grpSpPr>
+        <a:xfrm>
+          <a:off x="0" y="0"/>
+          <a:ext cx="0" cy="0"/>
+          <a:chOff x="0" y="0"/>
+          <a:chExt cx="0" cy="0"/>
+        </a:xfrm>
+      </p:grpSpPr>
+      <p:pic>
+        <p:nvPicPr>
+          <p:cNvPr id="13" name="Picture 12" descr="A white background with blue waves&#10;&#10;AI-generated content may be incorrect.">
+            <a:extLst>
+              <a:ext uri="{FF2B5EF4-FFF2-40B4-BE49-F238E27FC236}">
+                <a16:creationId xmlns:a16="http://schemas.microsoft.com/office/drawing/2014/main" id="{42BE72AD-CAB0-8545-8CEB-E663801DA230}"/>
+              </a:ext>
+            </a:extLst>
+          </p:cNvPr>
+          <p:cNvPicPr>
+            <a:picLocks noChangeAspect="1"/>
+          </p:cNvPicPr>
+          <p:nvPr/>
+        </p:nvPicPr>
+        <p:blipFill>
+          <a:blip r:embed="rId2">
+            <a:extLst>
+              <a:ext uri="{28A0092B-C50C-407E-A947-70E740481C1C}">
+                <a14:useLocalDpi xmlns:a14="http://schemas.microsoft.com/office/drawing/2010/main" val="0"/>
+              </a:ext>
+            </a:extLst>
+          </a:blip>
+          <a:stretch>
+            <a:fillRect/>
+          </a:stretch>
+        </p:blipFill>
+        <p:spPr>
+          <a:xfrm>
+            <a:off x="0" y="4281"/>
+            <a:ext cx="12192000" cy="6849438"/>
+          </a:xfrm>
+          <a:prstGeom prst="rect">
+            <a:avLst/>
+          </a:prstGeom>
+        </p:spPr>
+      </p:pic>
+      <p:sp>
+        <p:nvSpPr>
+          <p:cNvPr id="2" name="Title 1">
+            <a:extLst>
+              <a:ext uri="{FF2B5EF4-FFF2-40B4-BE49-F238E27FC236}">
+                <a16:creationId xmlns:a16="http://schemas.microsoft.com/office/drawing/2014/main" id="{D535998D-4277-DE5E-EABF-6DE51048015D}"/>
+              </a:ext>
+            </a:extLst>
+          </p:cNvPr>
+          <p:cNvSpPr>
+            <a:spLocks noGrp="1"/>
+          </p:cNvSpPr>
+          <p:nvPr>
+            <p:ph type="title"/>
+          </p:nvPr>
+        </p:nvSpPr>
+        <p:spPr>
+          <a:xfrm>
+            <a:off x="839788" y="365125"/>
+            <a:ext cx="10869282" cy="1325563"/>
+          </a:xfrm>
+        </p:spPr>
+        <p:txBody>
+          <a:bodyPr/>
+          <a:lstStyle/>
+          <a:p>
+            <a:r>
+              <a:rPr lang="en-US" dirty="0">
+                <a:latin typeface="Arial Rounded MT Bold" panose="020F0704030504030204" pitchFamily="34" charset="0"/>
+              </a:rPr>
+              <a:t>Our Architecture Today</a:t>
+            </a:r>
+          </a:p>
+        </p:txBody>
+      </p:sp>
+      <p:sp>
+        <p:nvSpPr>
+          <p:cNvPr id="5" name="Rectangle: Rounded Corners 4">
+            <a:extLst>
+              <a:ext uri="{FF2B5EF4-FFF2-40B4-BE49-F238E27FC236}">
+                <a16:creationId xmlns:a16="http://schemas.microsoft.com/office/drawing/2014/main" id="{AC9B4D44-2D85-B13A-CE4D-5E7B47B70B46}"/>
+              </a:ext>
+            </a:extLst>
+          </p:cNvPr>
+          <p:cNvSpPr/>
+          <p:nvPr/>
+        </p:nvSpPr>
+        <p:spPr>
+          <a:xfrm>
+            <a:off x="3906981" y="1702564"/>
+            <a:ext cx="3716977" cy="1325564"/>
+          </a:xfrm>
+          <a:prstGeom prst="roundRect">
+            <a:avLst/>
+          </a:prstGeom>
+          <a:noFill/>
+        </p:spPr>
+        <p:style>
+          <a:lnRef idx="2">
+            <a:schemeClr val="accent1">
+              <a:shade val="15000"/>
+            </a:schemeClr>
+          </a:lnRef>
+          <a:fillRef idx="1">
+            <a:schemeClr val="accent1"/>
+          </a:fillRef>
+          <a:effectRef idx="0">
+            <a:schemeClr val="accent1"/>
+          </a:effectRef>
+          <a:fontRef idx="minor">
+            <a:schemeClr val="lt1"/>
+          </a:fontRef>
+        </p:style>
+        <p:txBody>
+          <a:bodyPr rtlCol="0" anchor="ctr"/>
+          <a:lstStyle/>
+          <a:p>
+            <a:r>
+              <a:rPr lang="en-US" dirty="0">
+                <a:solidFill>
+                  <a:schemeClr val="tx1"/>
+                </a:solidFill>
+                <a:latin typeface="Arial Rounded MT Bold" panose="020F0704030504030204" pitchFamily="34" charset="0"/>
+              </a:rPr>
+              <a:t>ASP.NET Core Web App</a:t>
+            </a:r>
+          </a:p>
+          <a:p>
+            <a:r>
+              <a:rPr lang="en-US" dirty="0">
+                <a:solidFill>
+                  <a:schemeClr val="tx1"/>
+                </a:solidFill>
+                <a:latin typeface="Arial Rounded MT Bold" panose="020F0704030504030204" pitchFamily="34" charset="0"/>
+              </a:rPr>
+              <a:t>  |-- </a:t>
+            </a:r>
+            <a:r>
+              <a:rPr lang="en-US" sz="1600" dirty="0">
+                <a:solidFill>
+                  <a:schemeClr val="tx1"/>
+                </a:solidFill>
+                <a:latin typeface="Arial Rounded MT Bold" panose="020F0704030504030204" pitchFamily="34" charset="0"/>
+              </a:rPr>
+              <a:t>Blazor/React UI (Chat)</a:t>
+            </a:r>
+          </a:p>
+          <a:p>
+            <a:r>
+              <a:rPr lang="en-US" dirty="0">
+                <a:solidFill>
+                  <a:schemeClr val="tx1"/>
+                </a:solidFill>
+                <a:latin typeface="Arial Rounded MT Bold" panose="020F0704030504030204" pitchFamily="34" charset="0"/>
+              </a:rPr>
+              <a:t>  |-- </a:t>
+            </a:r>
+            <a:r>
+              <a:rPr lang="en-US" sz="1600" dirty="0">
+                <a:solidFill>
+                  <a:schemeClr val="tx1"/>
+                </a:solidFill>
+                <a:latin typeface="Arial Rounded MT Bold" panose="020F0704030504030204" pitchFamily="34" charset="0"/>
+              </a:rPr>
+              <a:t>C# Backend</a:t>
+            </a:r>
+          </a:p>
+          <a:p>
+            <a:r>
+              <a:rPr lang="en-US" dirty="0">
+                <a:solidFill>
+                  <a:schemeClr val="tx1"/>
+                </a:solidFill>
+                <a:latin typeface="Arial Rounded MT Bold" panose="020F0704030504030204" pitchFamily="34" charset="0"/>
+              </a:rPr>
+              <a:t>  |-- </a:t>
+            </a:r>
+            <a:r>
+              <a:rPr lang="en-US" sz="1600" dirty="0">
+                <a:solidFill>
+                  <a:schemeClr val="tx1"/>
+                </a:solidFill>
+                <a:latin typeface="Arial Rounded MT Bold" panose="020F0704030504030204" pitchFamily="34" charset="0"/>
+              </a:rPr>
+              <a:t>Azure AI Integration</a:t>
+            </a:r>
+          </a:p>
+        </p:txBody>
+      </p:sp>
+      <p:sp>
+        <p:nvSpPr>
+          <p:cNvPr id="7" name="Rectangle: Rounded Corners 6">
+            <a:extLst>
+              <a:ext uri="{FF2B5EF4-FFF2-40B4-BE49-F238E27FC236}">
+                <a16:creationId xmlns:a16="http://schemas.microsoft.com/office/drawing/2014/main" id="{C29DC265-E4B4-7C3A-8554-A09D8035BA56}"/>
+              </a:ext>
+            </a:extLst>
+          </p:cNvPr>
+          <p:cNvSpPr/>
+          <p:nvPr/>
+        </p:nvSpPr>
+        <p:spPr>
+          <a:xfrm>
+            <a:off x="3906980" y="3746745"/>
+            <a:ext cx="3716977" cy="765879"/>
+          </a:xfrm>
+          <a:prstGeom prst="roundRect">
+            <a:avLst/>
+          </a:prstGeom>
+          <a:noFill/>
+        </p:spPr>
+        <p:style>
+          <a:lnRef idx="2">
+            <a:schemeClr val="accent1">
+              <a:shade val="15000"/>
+            </a:schemeClr>
+          </a:lnRef>
+          <a:fillRef idx="1">
+            <a:schemeClr val="accent1"/>
+          </a:fillRef>
+          <a:effectRef idx="0">
+            <a:schemeClr val="accent1"/>
+          </a:effectRef>
+          <a:fontRef idx="minor">
+            <a:schemeClr val="lt1"/>
+          </a:fontRef>
+        </p:style>
+        <p:txBody>
+          <a:bodyPr rtlCol="0" anchor="ctr"/>
+          <a:lstStyle/>
+          <a:p>
+            <a:pPr algn="ctr"/>
+            <a:r>
+              <a:rPr lang="en-US" dirty="0">
+                <a:solidFill>
+                  <a:schemeClr val="tx1"/>
+                </a:solidFill>
+                <a:latin typeface="Arial Rounded MT Bold" panose="020F0704030504030204" pitchFamily="34" charset="0"/>
+              </a:rPr>
+              <a:t>MSSQL MCP Server (Node.js)</a:t>
+            </a:r>
+          </a:p>
+        </p:txBody>
+      </p:sp>
+      <p:sp>
+        <p:nvSpPr>
+          <p:cNvPr id="8" name="Rectangle: Rounded Corners 7">
+            <a:extLst>
+              <a:ext uri="{FF2B5EF4-FFF2-40B4-BE49-F238E27FC236}">
+                <a16:creationId xmlns:a16="http://schemas.microsoft.com/office/drawing/2014/main" id="{4621B28D-C0E6-9999-8137-CE577A140E5E}"/>
+              </a:ext>
+            </a:extLst>
+          </p:cNvPr>
+          <p:cNvSpPr/>
+          <p:nvPr/>
+        </p:nvSpPr>
+        <p:spPr>
+          <a:xfrm>
+            <a:off x="3906980" y="5258162"/>
+            <a:ext cx="3716977" cy="871131"/>
+          </a:xfrm>
+          <a:prstGeom prst="roundRect">
+            <a:avLst/>
+          </a:prstGeom>
+          <a:noFill/>
+        </p:spPr>
+        <p:style>
+          <a:lnRef idx="2">
+            <a:schemeClr val="accent1">
+              <a:shade val="15000"/>
+            </a:schemeClr>
+          </a:lnRef>
+          <a:fillRef idx="1">
+            <a:schemeClr val="accent1"/>
+          </a:fillRef>
+          <a:effectRef idx="0">
+            <a:schemeClr val="accent1"/>
+          </a:effectRef>
+          <a:fontRef idx="minor">
+            <a:schemeClr val="lt1"/>
+          </a:fontRef>
+        </p:style>
+        <p:txBody>
+          <a:bodyPr rtlCol="0" anchor="ctr"/>
+          <a:lstStyle/>
+          <a:p>
+            <a:pPr algn="ctr"/>
+            <a:r>
+              <a:rPr lang="en-US" dirty="0">
+                <a:solidFill>
+                  <a:schemeClr val="tx1"/>
+                </a:solidFill>
+                <a:latin typeface="Arial Rounded MT Bold" panose="020F0704030504030204" pitchFamily="34" charset="0"/>
+              </a:rPr>
+              <a:t>SQL Server Database</a:t>
+            </a:r>
+          </a:p>
+          <a:p>
+            <a:pPr algn="ctr"/>
+            <a:r>
+              <a:rPr lang="en-US" dirty="0">
+                <a:solidFill>
+                  <a:schemeClr val="tx1"/>
+                </a:solidFill>
+                <a:latin typeface="Arial Rounded MT Bold" panose="020F0704030504030204" pitchFamily="34" charset="0"/>
+              </a:rPr>
+              <a:t>(Event Management Schema</a:t>
+            </a:r>
+          </a:p>
+        </p:txBody>
+      </p:sp>
+      <p:cxnSp>
+        <p:nvCxnSpPr>
+          <p:cNvPr id="10" name="Straight Arrow Connector 9">
+            <a:extLst>
+              <a:ext uri="{FF2B5EF4-FFF2-40B4-BE49-F238E27FC236}">
+                <a16:creationId xmlns:a16="http://schemas.microsoft.com/office/drawing/2014/main" id="{99FC591E-6F09-C5CA-59AD-530D032DD6A8}"/>
+              </a:ext>
+            </a:extLst>
+          </p:cNvPr>
+          <p:cNvCxnSpPr>
+            <a:stCxn id="5" idx="2"/>
+            <a:endCxn id="7" idx="0"/>
+          </p:cNvCxnSpPr>
+          <p:nvPr/>
+        </p:nvCxnSpPr>
+        <p:spPr>
+          <a:xfrm flipH="1">
+            <a:off x="5765469" y="3028128"/>
+            <a:ext cx="1" cy="718617"/>
+          </a:xfrm>
+          <a:prstGeom prst="straightConnector1">
+            <a:avLst/>
+          </a:prstGeom>
+          <a:ln w="38100">
+            <a:solidFill>
+              <a:schemeClr val="tx1"/>
+            </a:solidFill>
+            <a:prstDash val="dash"/>
+            <a:tailEnd type="triangle"/>
+          </a:ln>
+        </p:spPr>
+        <p:style>
+          <a:lnRef idx="2">
+            <a:schemeClr val="accent1"/>
+          </a:lnRef>
+          <a:fillRef idx="0">
+            <a:schemeClr val="accent1"/>
+          </a:fillRef>
+          <a:effectRef idx="1">
+            <a:schemeClr val="accent1"/>
+          </a:effectRef>
+          <a:fontRef idx="minor">
+            <a:schemeClr val="tx1"/>
+          </a:fontRef>
+        </p:style>
+      </p:cxnSp>
+      <p:cxnSp>
+        <p:nvCxnSpPr>
+          <p:cNvPr id="11" name="Straight Arrow Connector 10">
+            <a:extLst>
+              <a:ext uri="{FF2B5EF4-FFF2-40B4-BE49-F238E27FC236}">
+                <a16:creationId xmlns:a16="http://schemas.microsoft.com/office/drawing/2014/main" id="{BB15B4B5-0784-70AC-E43D-3C46EF6FDBB1}"/>
+              </a:ext>
+            </a:extLst>
+          </p:cNvPr>
+          <p:cNvCxnSpPr/>
+          <p:nvPr/>
+        </p:nvCxnSpPr>
+        <p:spPr>
+          <a:xfrm flipH="1">
+            <a:off x="5765467" y="4512624"/>
+            <a:ext cx="1" cy="718617"/>
+          </a:xfrm>
+          <a:prstGeom prst="straightConnector1">
+            <a:avLst/>
+          </a:prstGeom>
+          <a:ln w="38100">
+            <a:solidFill>
+              <a:schemeClr val="tx1"/>
+            </a:solidFill>
+            <a:prstDash val="dash"/>
+            <a:tailEnd type="triangle"/>
+          </a:ln>
+        </p:spPr>
+        <p:style>
+          <a:lnRef idx="2">
+            <a:schemeClr val="accent1"/>
+          </a:lnRef>
+          <a:fillRef idx="0">
+            <a:schemeClr val="accent1"/>
+          </a:fillRef>
+          <a:effectRef idx="1">
+            <a:schemeClr val="accent1"/>
+          </a:effectRef>
+          <a:fontRef idx="minor">
+            <a:schemeClr val="tx1"/>
+          </a:fontRef>
+        </p:style>
+      </p:cxnSp>
+    </p:spTree>
+    <p:extLst>
+      <p:ext uri="{BB962C8B-B14F-4D97-AF65-F5344CB8AC3E}">
+        <p14:creationId xmlns:p14="http://schemas.microsoft.com/office/powerpoint/2010/main" val="2328144897"/>
+      </p:ext>
+    </p:extLst>
+  </p:cSld>
+  <p:clrMapOvr>
+    <a:masterClrMapping/>
+  </p:clrMapOvr>
+</p:sld>
+</file>
+
+<file path=ppt/slides/slide11.xml><?xml version="1.0" encoding="utf-8"?>
+<p:sld xmlns:a="http://schemas.openxmlformats.org/drawingml/2006/main" xmlns:r="http://schemas.openxmlformats.org/officeDocument/2006/relationships" xmlns:p="http://schemas.openxmlformats.org/presentationml/2006/main">
+  <p:cSld>
+    <p:spTree>
+      <p:nvGrpSpPr>
         <p:cNvPr id="1" name=""/>
         <p:cNvGrpSpPr/>
         <p:nvPr/>
@@ -8466,7 +8922,7 @@
 </p:sld>
 </file>
 
-<file path=ppt/slides/slide11.xml><?xml version="1.0" encoding="utf-8"?>
+<file path=ppt/slides/slide12.xml><?xml version="1.0" encoding="utf-8"?>
 <p:sld xmlns:a="http://schemas.openxmlformats.org/drawingml/2006/main" xmlns:r="http://schemas.openxmlformats.org/officeDocument/2006/relationships" xmlns:p="http://schemas.openxmlformats.org/presentationml/2006/main">
   <p:cSld>
     <p:spTree>
@@ -8649,7 +9105,7 @@
 </p:sld>
 </file>
 
-<file path=ppt/slides/slide12.xml><?xml version="1.0" encoding="utf-8"?>
+<file path=ppt/slides/slide13.xml><?xml version="1.0" encoding="utf-8"?>
 <p:sld xmlns:a="http://schemas.openxmlformats.org/drawingml/2006/main" xmlns:r="http://schemas.openxmlformats.org/officeDocument/2006/relationships" xmlns:p="http://schemas.openxmlformats.org/presentationml/2006/main">
   <p:cSld>
     <p:spTree>
@@ -8819,7 +9275,7 @@
 </p:sld>
 </file>
 
-<file path=ppt/slides/slide13.xml><?xml version="1.0" encoding="utf-8"?>
+<file path=ppt/slides/slide14.xml><?xml version="1.0" encoding="utf-8"?>
 <p:sld xmlns:a="http://schemas.openxmlformats.org/drawingml/2006/main" xmlns:r="http://schemas.openxmlformats.org/officeDocument/2006/relationships" xmlns:p="http://schemas.openxmlformats.org/presentationml/2006/main">
   <p:cSld>
     <p:spTree>
@@ -9358,6 +9814,96 @@
 </file>
 
 <file path=ppt/slides/slide2.xml><?xml version="1.0" encoding="utf-8"?>
+<p:sld xmlns:a="http://schemas.openxmlformats.org/drawingml/2006/main" xmlns:r="http://schemas.openxmlformats.org/officeDocument/2006/relationships" xmlns:p="http://schemas.openxmlformats.org/presentationml/2006/main">
+  <p:cSld>
+    <p:spTree>
+      <p:nvGrpSpPr>
+        <p:cNvPr id="1" name=""/>
+        <p:cNvGrpSpPr/>
+        <p:nvPr/>
+      </p:nvGrpSpPr>
+      <p:grpSpPr>
+        <a:xfrm>
+          <a:off x="0" y="0"/>
+          <a:ext cx="0" cy="0"/>
+          <a:chOff x="0" y="0"/>
+          <a:chExt cx="0" cy="0"/>
+        </a:xfrm>
+      </p:grpSpPr>
+      <p:sp>
+        <p:nvSpPr>
+          <p:cNvPr id="2" name="Title 1">
+            <a:extLst>
+              <a:ext uri="{FF2B5EF4-FFF2-40B4-BE49-F238E27FC236}">
+                <a16:creationId xmlns:a16="http://schemas.microsoft.com/office/drawing/2014/main" id="{84E36576-CB04-8D7F-19B5-ACF5B083880F}"/>
+              </a:ext>
+            </a:extLst>
+          </p:cNvPr>
+          <p:cNvSpPr>
+            <a:spLocks noGrp="1"/>
+          </p:cNvSpPr>
+          <p:nvPr>
+            <p:ph type="title"/>
+          </p:nvPr>
+        </p:nvSpPr>
+        <p:spPr/>
+        <p:txBody>
+          <a:bodyPr/>
+          <a:lstStyle/>
+          <a:p>
+            <a:endParaRPr lang="en-US"/>
+          </a:p>
+        </p:txBody>
+      </p:sp>
+      <p:pic>
+        <p:nvPicPr>
+          <p:cNvPr id="5" name="Content Placeholder 4" descr="A screenshot of a blue background with white text&#10;&#10;AI-generated content may be incorrect.">
+            <a:extLst>
+              <a:ext uri="{FF2B5EF4-FFF2-40B4-BE49-F238E27FC236}">
+                <a16:creationId xmlns:a16="http://schemas.microsoft.com/office/drawing/2014/main" id="{66609B0F-81B9-A35C-20AB-5CB38BBEA825}"/>
+              </a:ext>
+            </a:extLst>
+          </p:cNvPr>
+          <p:cNvPicPr>
+            <a:picLocks noGrp="1" noChangeAspect="1"/>
+          </p:cNvPicPr>
+          <p:nvPr>
+            <p:ph idx="1"/>
+          </p:nvPr>
+        </p:nvPicPr>
+        <p:blipFill>
+          <a:blip r:embed="rId2">
+            <a:extLst>
+              <a:ext uri="{28A0092B-C50C-407E-A947-70E740481C1C}">
+                <a14:useLocalDpi xmlns:a14="http://schemas.microsoft.com/office/drawing/2010/main" val="0"/>
+              </a:ext>
+            </a:extLst>
+          </a:blip>
+          <a:stretch>
+            <a:fillRect/>
+          </a:stretch>
+        </p:blipFill>
+        <p:spPr>
+          <a:xfrm>
+            <a:off x="0" y="0"/>
+            <a:ext cx="12192000" cy="6858000"/>
+          </a:xfrm>
+        </p:spPr>
+      </p:pic>
+    </p:spTree>
+    <p:extLst>
+      <p:ext uri="{BB962C8B-B14F-4D97-AF65-F5344CB8AC3E}">
+        <p14:creationId xmlns:p14="http://schemas.microsoft.com/office/powerpoint/2010/main" val="2813410835"/>
+      </p:ext>
+    </p:extLst>
+  </p:cSld>
+  <p:clrMapOvr>
+    <a:masterClrMapping/>
+  </p:clrMapOvr>
+</p:sld>
+</file>
+
+<file path=ppt/slides/slide3.xml><?xml version="1.0" encoding="utf-8"?>
 <p:sld xmlns:a="http://schemas.openxmlformats.org/drawingml/2006/main" xmlns:r="http://schemas.openxmlformats.org/officeDocument/2006/relationships" xmlns:p="http://schemas.openxmlformats.org/presentationml/2006/main">
   <p:cSld>
     <p:spTree>
@@ -9699,7 +10245,7 @@
 </p:sld>
 </file>
 
-<file path=ppt/slides/slide3.xml><?xml version="1.0" encoding="utf-8"?>
+<file path=ppt/slides/slide4.xml><?xml version="1.0" encoding="utf-8"?>
 <p:sld xmlns:a="http://schemas.openxmlformats.org/drawingml/2006/main" xmlns:r="http://schemas.openxmlformats.org/officeDocument/2006/relationships" xmlns:p="http://schemas.openxmlformats.org/presentationml/2006/main">
   <p:cSld>
     <p:spTree>
@@ -9987,7 +10533,7 @@
 </p:sld>
 </file>
 
-<file path=ppt/slides/slide4.xml><?xml version="1.0" encoding="utf-8"?>
+<file path=ppt/slides/slide5.xml><?xml version="1.0" encoding="utf-8"?>
 <p:sld xmlns:a="http://schemas.openxmlformats.org/drawingml/2006/main" xmlns:r="http://schemas.openxmlformats.org/officeDocument/2006/relationships" xmlns:p="http://schemas.openxmlformats.org/presentationml/2006/main">
   <p:cSld>
     <p:spTree>
@@ -10182,7 +10728,7 @@
 </p:sld>
 </file>
 
-<file path=ppt/slides/slide5.xml><?xml version="1.0" encoding="utf-8"?>
+<file path=ppt/slides/slide6.xml><?xml version="1.0" encoding="utf-8"?>
 <p:sld xmlns:a="http://schemas.openxmlformats.org/drawingml/2006/main" xmlns:r="http://schemas.openxmlformats.org/officeDocument/2006/relationships" xmlns:p="http://schemas.openxmlformats.org/presentationml/2006/main">
   <p:cSld>
     <p:spTree>
@@ -10612,7 +11158,7 @@
 </p:sld>
 </file>
 
-<file path=ppt/slides/slide6.xml><?xml version="1.0" encoding="utf-8"?>
+<file path=ppt/slides/slide7.xml><?xml version="1.0" encoding="utf-8"?>
 <p:sld xmlns:a="http://schemas.openxmlformats.org/drawingml/2006/main" xmlns:r="http://schemas.openxmlformats.org/officeDocument/2006/relationships" xmlns:p="http://schemas.openxmlformats.org/presentationml/2006/main">
   <p:cSld>
     <p:spTree>
@@ -11920,7 +12466,7 @@
 </p:sld>
 </file>
 
-<file path=ppt/slides/slide7.xml><?xml version="1.0" encoding="utf-8"?>
+<file path=ppt/slides/slide8.xml><?xml version="1.0" encoding="utf-8"?>
 <p:sld xmlns:a="http://schemas.openxmlformats.org/drawingml/2006/main" xmlns:r="http://schemas.openxmlformats.org/officeDocument/2006/relationships" xmlns:p="http://schemas.openxmlformats.org/presentationml/2006/main">
   <p:cSld>
     <p:spTree>
@@ -12114,7 +12660,7 @@
 </p:sld>
 </file>
 
-<file path=ppt/slides/slide8.xml><?xml version="1.0" encoding="utf-8"?>
+<file path=ppt/slides/slide9.xml><?xml version="1.0" encoding="utf-8"?>
 <p:sld xmlns:a="http://schemas.openxmlformats.org/drawingml/2006/main" xmlns:r="http://schemas.openxmlformats.org/officeDocument/2006/relationships" xmlns:p="http://schemas.openxmlformats.org/presentationml/2006/main">
   <p:cSld>
     <p:spTree>
@@ -12357,438 +12903,6 @@
     <p:extLst>
       <p:ext uri="{BB962C8B-B14F-4D97-AF65-F5344CB8AC3E}">
         <p14:creationId xmlns:p14="http://schemas.microsoft.com/office/powerpoint/2010/main" val="156162954"/>
-      </p:ext>
-    </p:extLst>
-  </p:cSld>
-  <p:clrMapOvr>
-    <a:masterClrMapping/>
-  </p:clrMapOvr>
-</p:sld>
-</file>
-
-<file path=ppt/slides/slide9.xml><?xml version="1.0" encoding="utf-8"?>
-<p:sld xmlns:a="http://schemas.openxmlformats.org/drawingml/2006/main" xmlns:r="http://schemas.openxmlformats.org/officeDocument/2006/relationships" xmlns:p="http://schemas.openxmlformats.org/presentationml/2006/main">
-  <p:cSld>
-    <p:spTree>
-      <p:nvGrpSpPr>
-        <p:cNvPr id="1" name="">
-          <a:extLst>
-            <a:ext uri="{FF2B5EF4-FFF2-40B4-BE49-F238E27FC236}">
-              <a16:creationId xmlns:a16="http://schemas.microsoft.com/office/drawing/2014/main" id="{C388E8A5-BD65-7336-7770-6E8D27EE2117}"/>
-            </a:ext>
-          </a:extLst>
-        </p:cNvPr>
-        <p:cNvGrpSpPr/>
-        <p:nvPr/>
-      </p:nvGrpSpPr>
-      <p:grpSpPr>
-        <a:xfrm>
-          <a:off x="0" y="0"/>
-          <a:ext cx="0" cy="0"/>
-          <a:chOff x="0" y="0"/>
-          <a:chExt cx="0" cy="0"/>
-        </a:xfrm>
-      </p:grpSpPr>
-      <p:pic>
-        <p:nvPicPr>
-          <p:cNvPr id="13" name="Picture 12" descr="A white background with blue waves&#10;&#10;AI-generated content may be incorrect.">
-            <a:extLst>
-              <a:ext uri="{FF2B5EF4-FFF2-40B4-BE49-F238E27FC236}">
-                <a16:creationId xmlns:a16="http://schemas.microsoft.com/office/drawing/2014/main" id="{42BE72AD-CAB0-8545-8CEB-E663801DA230}"/>
-              </a:ext>
-            </a:extLst>
-          </p:cNvPr>
-          <p:cNvPicPr>
-            <a:picLocks noChangeAspect="1"/>
-          </p:cNvPicPr>
-          <p:nvPr/>
-        </p:nvPicPr>
-        <p:blipFill>
-          <a:blip r:embed="rId2">
-            <a:extLst>
-              <a:ext uri="{28A0092B-C50C-407E-A947-70E740481C1C}">
-                <a14:useLocalDpi xmlns:a14="http://schemas.microsoft.com/office/drawing/2010/main" val="0"/>
-              </a:ext>
-            </a:extLst>
-          </a:blip>
-          <a:stretch>
-            <a:fillRect/>
-          </a:stretch>
-        </p:blipFill>
-        <p:spPr>
-          <a:xfrm>
-            <a:off x="0" y="4281"/>
-            <a:ext cx="12192000" cy="6849438"/>
-          </a:xfrm>
-          <a:prstGeom prst="rect">
-            <a:avLst/>
-          </a:prstGeom>
-        </p:spPr>
-      </p:pic>
-      <p:sp>
-        <p:nvSpPr>
-          <p:cNvPr id="2" name="Title 1">
-            <a:extLst>
-              <a:ext uri="{FF2B5EF4-FFF2-40B4-BE49-F238E27FC236}">
-                <a16:creationId xmlns:a16="http://schemas.microsoft.com/office/drawing/2014/main" id="{D535998D-4277-DE5E-EABF-6DE51048015D}"/>
-              </a:ext>
-            </a:extLst>
-          </p:cNvPr>
-          <p:cNvSpPr>
-            <a:spLocks noGrp="1"/>
-          </p:cNvSpPr>
-          <p:nvPr>
-            <p:ph type="title"/>
-          </p:nvPr>
-        </p:nvSpPr>
-        <p:spPr>
-          <a:xfrm>
-            <a:off x="839788" y="365125"/>
-            <a:ext cx="10869282" cy="1325563"/>
-          </a:xfrm>
-        </p:spPr>
-        <p:txBody>
-          <a:bodyPr/>
-          <a:lstStyle/>
-          <a:p>
-            <a:r>
-              <a:rPr lang="en-US" dirty="0">
-                <a:latin typeface="Arial Rounded MT Bold" panose="020F0704030504030204" pitchFamily="34" charset="0"/>
-              </a:rPr>
-              <a:t>Our Architecture Today</a:t>
-            </a:r>
-          </a:p>
-        </p:txBody>
-      </p:sp>
-      <p:sp>
-        <p:nvSpPr>
-          <p:cNvPr id="5" name="Rectangle: Rounded Corners 4">
-            <a:extLst>
-              <a:ext uri="{FF2B5EF4-FFF2-40B4-BE49-F238E27FC236}">
-                <a16:creationId xmlns:a16="http://schemas.microsoft.com/office/drawing/2014/main" id="{AC9B4D44-2D85-B13A-CE4D-5E7B47B70B46}"/>
-              </a:ext>
-            </a:extLst>
-          </p:cNvPr>
-          <p:cNvSpPr/>
-          <p:nvPr/>
-        </p:nvSpPr>
-        <p:spPr>
-          <a:xfrm>
-            <a:off x="3906981" y="1702564"/>
-            <a:ext cx="3716977" cy="1325564"/>
-          </a:xfrm>
-          <a:prstGeom prst="roundRect">
-            <a:avLst/>
-          </a:prstGeom>
-          <a:noFill/>
-        </p:spPr>
-        <p:style>
-          <a:lnRef idx="2">
-            <a:schemeClr val="accent1">
-              <a:shade val="15000"/>
-            </a:schemeClr>
-          </a:lnRef>
-          <a:fillRef idx="1">
-            <a:schemeClr val="accent1"/>
-          </a:fillRef>
-          <a:effectRef idx="0">
-            <a:schemeClr val="accent1"/>
-          </a:effectRef>
-          <a:fontRef idx="minor">
-            <a:schemeClr val="lt1"/>
-          </a:fontRef>
-        </p:style>
-        <p:txBody>
-          <a:bodyPr rtlCol="0" anchor="ctr"/>
-          <a:lstStyle/>
-          <a:p>
-            <a:r>
-              <a:rPr lang="en-US" dirty="0">
-                <a:solidFill>
-                  <a:schemeClr val="tx1"/>
-                </a:solidFill>
-                <a:latin typeface="Arial Rounded MT Bold" panose="020F0704030504030204" pitchFamily="34" charset="0"/>
-              </a:rPr>
-              <a:t>ASP.NET Core Web App</a:t>
-            </a:r>
-          </a:p>
-          <a:p>
-            <a:r>
-              <a:rPr lang="en-US" dirty="0">
-                <a:solidFill>
-                  <a:schemeClr val="tx1"/>
-                </a:solidFill>
-                <a:latin typeface="Arial Rounded MT Bold" panose="020F0704030504030204" pitchFamily="34" charset="0"/>
-              </a:rPr>
-              <a:t>  |-- </a:t>
-            </a:r>
-            <a:r>
-              <a:rPr lang="en-US" sz="1600" dirty="0">
-                <a:solidFill>
-                  <a:schemeClr val="tx1"/>
-                </a:solidFill>
-                <a:latin typeface="Arial Rounded MT Bold" panose="020F0704030504030204" pitchFamily="34" charset="0"/>
-              </a:rPr>
-              <a:t>Blazor/React UI (Chat)</a:t>
-            </a:r>
-          </a:p>
-          <a:p>
-            <a:r>
-              <a:rPr lang="en-US" dirty="0">
-                <a:solidFill>
-                  <a:schemeClr val="tx1"/>
-                </a:solidFill>
-                <a:latin typeface="Arial Rounded MT Bold" panose="020F0704030504030204" pitchFamily="34" charset="0"/>
-              </a:rPr>
-              <a:t>  |-- </a:t>
-            </a:r>
-            <a:r>
-              <a:rPr lang="en-US" sz="1600" dirty="0">
-                <a:solidFill>
-                  <a:schemeClr val="tx1"/>
-                </a:solidFill>
-                <a:latin typeface="Arial Rounded MT Bold" panose="020F0704030504030204" pitchFamily="34" charset="0"/>
-              </a:rPr>
-              <a:t>C# Backend</a:t>
-            </a:r>
-          </a:p>
-          <a:p>
-            <a:r>
-              <a:rPr lang="en-US" dirty="0">
-                <a:solidFill>
-                  <a:schemeClr val="tx1"/>
-                </a:solidFill>
-                <a:latin typeface="Arial Rounded MT Bold" panose="020F0704030504030204" pitchFamily="34" charset="0"/>
-              </a:rPr>
-              <a:t>  |-- </a:t>
-            </a:r>
-            <a:r>
-              <a:rPr lang="en-US" sz="1600" dirty="0">
-                <a:solidFill>
-                  <a:schemeClr val="tx1"/>
-                </a:solidFill>
-                <a:latin typeface="Arial Rounded MT Bold" panose="020F0704030504030204" pitchFamily="34" charset="0"/>
-              </a:rPr>
-              <a:t>Azure AI Integration</a:t>
-            </a:r>
-          </a:p>
-        </p:txBody>
-      </p:sp>
-      <p:sp>
-        <p:nvSpPr>
-          <p:cNvPr id="7" name="Rectangle: Rounded Corners 6">
-            <a:extLst>
-              <a:ext uri="{FF2B5EF4-FFF2-40B4-BE49-F238E27FC236}">
-                <a16:creationId xmlns:a16="http://schemas.microsoft.com/office/drawing/2014/main" id="{C29DC265-E4B4-7C3A-8554-A09D8035BA56}"/>
-              </a:ext>
-            </a:extLst>
-          </p:cNvPr>
-          <p:cNvSpPr/>
-          <p:nvPr/>
-        </p:nvSpPr>
-        <p:spPr>
-          <a:xfrm>
-            <a:off x="3906980" y="3746745"/>
-            <a:ext cx="3716977" cy="765879"/>
-          </a:xfrm>
-          <a:prstGeom prst="roundRect">
-            <a:avLst/>
-          </a:prstGeom>
-          <a:noFill/>
-        </p:spPr>
-        <p:style>
-          <a:lnRef idx="2">
-            <a:schemeClr val="accent1">
-              <a:shade val="15000"/>
-            </a:schemeClr>
-          </a:lnRef>
-          <a:fillRef idx="1">
-            <a:schemeClr val="accent1"/>
-          </a:fillRef>
-          <a:effectRef idx="0">
-            <a:schemeClr val="accent1"/>
-          </a:effectRef>
-          <a:fontRef idx="minor">
-            <a:schemeClr val="lt1"/>
-          </a:fontRef>
-        </p:style>
-        <p:txBody>
-          <a:bodyPr rtlCol="0" anchor="ctr"/>
-          <a:lstStyle/>
-          <a:p>
-            <a:pPr algn="ctr"/>
-            <a:r>
-              <a:rPr lang="en-US" dirty="0">
-                <a:solidFill>
-                  <a:schemeClr val="tx1"/>
-                </a:solidFill>
-                <a:latin typeface="Arial Rounded MT Bold" panose="020F0704030504030204" pitchFamily="34" charset="0"/>
-              </a:rPr>
-              <a:t>MSSQL MCP Server (Node.js)</a:t>
-            </a:r>
-          </a:p>
-        </p:txBody>
-      </p:sp>
-      <p:sp>
-        <p:nvSpPr>
-          <p:cNvPr id="8" name="Rectangle: Rounded Corners 7">
-            <a:extLst>
-              <a:ext uri="{FF2B5EF4-FFF2-40B4-BE49-F238E27FC236}">
-                <a16:creationId xmlns:a16="http://schemas.microsoft.com/office/drawing/2014/main" id="{4621B28D-C0E6-9999-8137-CE577A140E5E}"/>
-              </a:ext>
-            </a:extLst>
-          </p:cNvPr>
-          <p:cNvSpPr/>
-          <p:nvPr/>
-        </p:nvSpPr>
-        <p:spPr>
-          <a:xfrm>
-            <a:off x="3906980" y="5258162"/>
-            <a:ext cx="3716977" cy="871131"/>
-          </a:xfrm>
-          <a:prstGeom prst="roundRect">
-            <a:avLst/>
-          </a:prstGeom>
-          <a:noFill/>
-        </p:spPr>
-        <p:style>
-          <a:lnRef idx="2">
-            <a:schemeClr val="accent1">
-              <a:shade val="15000"/>
-            </a:schemeClr>
-          </a:lnRef>
-          <a:fillRef idx="1">
-            <a:schemeClr val="accent1"/>
-          </a:fillRef>
-          <a:effectRef idx="0">
-            <a:schemeClr val="accent1"/>
-          </a:effectRef>
-          <a:fontRef idx="minor">
-            <a:schemeClr val="lt1"/>
-          </a:fontRef>
-        </p:style>
-        <p:txBody>
-          <a:bodyPr rtlCol="0" anchor="ctr"/>
-          <a:lstStyle/>
-          <a:p>
-            <a:pPr algn="ctr"/>
-            <a:r>
-              <a:rPr lang="en-US" dirty="0">
-                <a:solidFill>
-                  <a:schemeClr val="tx1"/>
-                </a:solidFill>
-                <a:latin typeface="Arial Rounded MT Bold" panose="020F0704030504030204" pitchFamily="34" charset="0"/>
-              </a:rPr>
-              <a:t>SQL Server Database</a:t>
-            </a:r>
-          </a:p>
-          <a:p>
-            <a:pPr algn="ctr"/>
-            <a:r>
-              <a:rPr lang="en-US" dirty="0">
-                <a:solidFill>
-                  <a:schemeClr val="tx1"/>
-                </a:solidFill>
-                <a:latin typeface="Arial Rounded MT Bold" panose="020F0704030504030204" pitchFamily="34" charset="0"/>
-              </a:rPr>
-              <a:t>(Event Management Schema</a:t>
-            </a:r>
-          </a:p>
-        </p:txBody>
-      </p:sp>
-      <p:cxnSp>
-        <p:nvCxnSpPr>
-          <p:cNvPr id="10" name="Straight Arrow Connector 9">
-            <a:extLst>
-              <a:ext uri="{FF2B5EF4-FFF2-40B4-BE49-F238E27FC236}">
-                <a16:creationId xmlns:a16="http://schemas.microsoft.com/office/drawing/2014/main" id="{99FC591E-6F09-C5CA-59AD-530D032DD6A8}"/>
-              </a:ext>
-            </a:extLst>
-          </p:cNvPr>
-          <p:cNvCxnSpPr>
-            <a:stCxn id="5" idx="2"/>
-            <a:endCxn id="7" idx="0"/>
-          </p:cNvCxnSpPr>
-          <p:nvPr/>
-        </p:nvCxnSpPr>
-        <p:spPr>
-          <a:xfrm flipH="1">
-            <a:off x="5765469" y="3028128"/>
-            <a:ext cx="1" cy="718617"/>
-          </a:xfrm>
-          <a:prstGeom prst="straightConnector1">
-            <a:avLst/>
-          </a:prstGeom>
-          <a:ln w="38100">
-            <a:solidFill>
-              <a:schemeClr val="tx1"/>
-            </a:solidFill>
-            <a:prstDash val="dash"/>
-            <a:tailEnd type="triangle"/>
-          </a:ln>
-        </p:spPr>
-        <p:style>
-          <a:lnRef idx="2">
-            <a:schemeClr val="accent1"/>
-          </a:lnRef>
-          <a:fillRef idx="0">
-            <a:schemeClr val="accent1"/>
-          </a:fillRef>
-          <a:effectRef idx="1">
-            <a:schemeClr val="accent1"/>
-          </a:effectRef>
-          <a:fontRef idx="minor">
-            <a:schemeClr val="tx1"/>
-          </a:fontRef>
-        </p:style>
-      </p:cxnSp>
-      <p:cxnSp>
-        <p:nvCxnSpPr>
-          <p:cNvPr id="11" name="Straight Arrow Connector 10">
-            <a:extLst>
-              <a:ext uri="{FF2B5EF4-FFF2-40B4-BE49-F238E27FC236}">
-                <a16:creationId xmlns:a16="http://schemas.microsoft.com/office/drawing/2014/main" id="{BB15B4B5-0784-70AC-E43D-3C46EF6FDBB1}"/>
-              </a:ext>
-            </a:extLst>
-          </p:cNvPr>
-          <p:cNvCxnSpPr/>
-          <p:nvPr/>
-        </p:nvCxnSpPr>
-        <p:spPr>
-          <a:xfrm flipH="1">
-            <a:off x="5765467" y="4512624"/>
-            <a:ext cx="1" cy="718617"/>
-          </a:xfrm>
-          <a:prstGeom prst="straightConnector1">
-            <a:avLst/>
-          </a:prstGeom>
-          <a:ln w="38100">
-            <a:solidFill>
-              <a:schemeClr val="tx1"/>
-            </a:solidFill>
-            <a:prstDash val="dash"/>
-            <a:tailEnd type="triangle"/>
-          </a:ln>
-        </p:spPr>
-        <p:style>
-          <a:lnRef idx="2">
-            <a:schemeClr val="accent1"/>
-          </a:lnRef>
-          <a:fillRef idx="0">
-            <a:schemeClr val="accent1"/>
-          </a:fillRef>
-          <a:effectRef idx="1">
-            <a:schemeClr val="accent1"/>
-          </a:effectRef>
-          <a:fontRef idx="minor">
-            <a:schemeClr val="tx1"/>
-          </a:fontRef>
-        </p:style>
-      </p:cxnSp>
-    </p:spTree>
-    <p:extLst>
-      <p:ext uri="{BB962C8B-B14F-4D97-AF65-F5344CB8AC3E}">
-        <p14:creationId xmlns:p14="http://schemas.microsoft.com/office/powerpoint/2010/main" val="2328144897"/>
       </p:ext>
     </p:extLst>
   </p:cSld>

</xml_diff>